<commit_message>
updated documentation + latest results
</commit_message>
<xml_diff>
--- a/readme.pptx
+++ b/readme.pptx
@@ -4,13 +4,19 @@
   <p:sldMasterIdLst>
     <p:sldMasterId id="2147483708" r:id="rId1"/>
   </p:sldMasterIdLst>
+  <p:notesMasterIdLst>
+    <p:notesMasterId r:id="rId11"/>
+  </p:notesMasterIdLst>
   <p:sldIdLst>
     <p:sldId id="256" r:id="rId2"/>
     <p:sldId id="257" r:id="rId3"/>
     <p:sldId id="258" r:id="rId4"/>
     <p:sldId id="259" r:id="rId5"/>
     <p:sldId id="260" r:id="rId6"/>
-    <p:sldId id="261" r:id="rId7"/>
+    <p:sldId id="262" r:id="rId7"/>
+    <p:sldId id="263" r:id="rId8"/>
+    <p:sldId id="264" r:id="rId9"/>
+    <p:sldId id="261" r:id="rId10"/>
   </p:sldIdLst>
   <p:sldSz cx="12192000" cy="6858000"/>
   <p:notesSz cx="6858000" cy="9144000"/>
@@ -109,443 +115,625 @@
       </a:defRPr>
     </a:lvl9pPr>
   </p:defaultTextStyle>
+  <p:extLst>
+    <p:ext uri="{EFAFB233-063F-42B5-8137-9DF3F51BA10A}">
+      <p15:sldGuideLst xmlns:p15="http://schemas.microsoft.com/office/powerpoint/2012/main"/>
+    </p:ext>
+  </p:extLst>
 </p:presentation>
 </file>
 
 <file path=ppt/changesInfos/changesInfo1.xml><?xml version="1.0" encoding="utf-8"?>
 <pc:chgInfo xmlns:a="http://schemas.openxmlformats.org/drawingml/2006/main" xmlns:r="http://schemas.openxmlformats.org/officeDocument/2006/relationships" xmlns:ac="http://schemas.microsoft.com/office/drawing/2013/main/command" xmlns:pc="http://schemas.microsoft.com/office/powerpoint/2013/main/command">
   <pc:docChgLst>
-    <pc:chgData name="Mrinav Saxena" userId="1ae1cb636c956b49" providerId="LiveId" clId="{AD516D71-32E7-414E-95C0-D496F34FCB5E}"/>
-    <pc:docChg chg="undo custSel addSld modSld addMainMaster delMainMaster modMainMaster">
-      <pc:chgData name="Mrinav Saxena" userId="1ae1cb636c956b49" providerId="LiveId" clId="{AD516D71-32E7-414E-95C0-D496F34FCB5E}" dt="2025-08-31T06:00:44.151" v="379" actId="20577"/>
+    <pc:chgData name="Mrinav Saxena" userId="1ae1cb636c956b49" providerId="LiveId" clId="{A2E5E654-390A-46A7-A8C6-614B0BD28A59}"/>
+    <pc:docChg chg="undo redo custSel addSld modSld">
+      <pc:chgData name="Mrinav Saxena" userId="1ae1cb636c956b49" providerId="LiveId" clId="{A2E5E654-390A-46A7-A8C6-614B0BD28A59}" dt="2025-09-04T17:31:49.156" v="2924" actId="20577"/>
       <pc:docMkLst>
         <pc:docMk/>
       </pc:docMkLst>
-      <pc:sldChg chg="modSp mod">
-        <pc:chgData name="Mrinav Saxena" userId="1ae1cb636c956b49" providerId="LiveId" clId="{AD516D71-32E7-414E-95C0-D496F34FCB5E}" dt="2025-08-30T11:15:01.314" v="44"/>
+      <pc:sldChg chg="modSp new mod">
+        <pc:chgData name="Mrinav Saxena" userId="1ae1cb636c956b49" providerId="LiveId" clId="{A2E5E654-390A-46A7-A8C6-614B0BD28A59}" dt="2025-09-03T05:59:00.572" v="704" actId="20577"/>
         <pc:sldMkLst>
           <pc:docMk/>
-          <pc:sldMk cId="50760509" sldId="256"/>
+          <pc:sldMk cId="2158570234" sldId="262"/>
         </pc:sldMkLst>
         <pc:spChg chg="mod">
-          <ac:chgData name="Mrinav Saxena" userId="1ae1cb636c956b49" providerId="LiveId" clId="{AD516D71-32E7-414E-95C0-D496F34FCB5E}" dt="2025-08-30T11:15:01.314" v="44"/>
+          <ac:chgData name="Mrinav Saxena" userId="1ae1cb636c956b49" providerId="LiveId" clId="{A2E5E654-390A-46A7-A8C6-614B0BD28A59}" dt="2025-09-03T05:19:41.285" v="33" actId="20577"/>
           <ac:spMkLst>
             <pc:docMk/>
-            <pc:sldMk cId="50760509" sldId="256"/>
-            <ac:spMk id="2" creationId="{C8EFB579-D184-2F39-D990-FE98D384DCA6}"/>
+            <pc:sldMk cId="2158570234" sldId="262"/>
+            <ac:spMk id="2" creationId="{1ECAD9DE-7B28-46B6-9CDB-A8CC82E8EDDD}"/>
           </ac:spMkLst>
         </pc:spChg>
         <pc:spChg chg="mod">
-          <ac:chgData name="Mrinav Saxena" userId="1ae1cb636c956b49" providerId="LiveId" clId="{AD516D71-32E7-414E-95C0-D496F34FCB5E}" dt="2025-08-30T11:15:01.314" v="44"/>
+          <ac:chgData name="Mrinav Saxena" userId="1ae1cb636c956b49" providerId="LiveId" clId="{A2E5E654-390A-46A7-A8C6-614B0BD28A59}" dt="2025-09-03T05:59:00.572" v="704" actId="20577"/>
           <ac:spMkLst>
             <pc:docMk/>
-            <pc:sldMk cId="50760509" sldId="256"/>
-            <ac:spMk id="3" creationId="{08C84912-AE2B-9697-966A-874296CB4BBB}"/>
+            <pc:sldMk cId="2158570234" sldId="262"/>
+            <ac:spMk id="3" creationId="{71F06692-38CD-FD23-5E69-A0402A835775}"/>
           </ac:spMkLst>
         </pc:spChg>
       </pc:sldChg>
-      <pc:sldChg chg="modSp mod modClrScheme chgLayout">
-        <pc:chgData name="Mrinav Saxena" userId="1ae1cb636c956b49" providerId="LiveId" clId="{AD516D71-32E7-414E-95C0-D496F34FCB5E}" dt="2025-08-31T05:58:49.058" v="345" actId="20577"/>
+      <pc:sldChg chg="modSp add mod modNotesTx">
+        <pc:chgData name="Mrinav Saxena" userId="1ae1cb636c956b49" providerId="LiveId" clId="{A2E5E654-390A-46A7-A8C6-614B0BD28A59}" dt="2025-09-04T17:31:33.397" v="2915" actId="20577"/>
         <pc:sldMkLst>
           <pc:docMk/>
-          <pc:sldMk cId="4151146002" sldId="257"/>
+          <pc:sldMk cId="2974123424" sldId="263"/>
         </pc:sldMkLst>
-        <pc:spChg chg="mod ord">
-          <ac:chgData name="Mrinav Saxena" userId="1ae1cb636c956b49" providerId="LiveId" clId="{AD516D71-32E7-414E-95C0-D496F34FCB5E}" dt="2025-08-31T05:58:49.058" v="345" actId="20577"/>
+        <pc:spChg chg="mod">
+          <ac:chgData name="Mrinav Saxena" userId="1ae1cb636c956b49" providerId="LiveId" clId="{A2E5E654-390A-46A7-A8C6-614B0BD28A59}" dt="2025-09-04T17:31:33.397" v="2915" actId="20577"/>
           <ac:spMkLst>
             <pc:docMk/>
-            <pc:sldMk cId="4151146002" sldId="257"/>
-            <ac:spMk id="2" creationId="{ED164D76-144A-D478-EFAB-C146D2478B71}"/>
-          </ac:spMkLst>
-        </pc:spChg>
-        <pc:spChg chg="mod ord">
-          <ac:chgData name="Mrinav Saxena" userId="1ae1cb636c956b49" providerId="LiveId" clId="{AD516D71-32E7-414E-95C0-D496F34FCB5E}" dt="2025-08-30T11:29:25.612" v="193" actId="20577"/>
-          <ac:spMkLst>
-            <pc:docMk/>
-            <pc:sldMk cId="4151146002" sldId="257"/>
-            <ac:spMk id="3" creationId="{EA321F3A-B496-5897-01F6-43EFBAA38C11}"/>
+            <pc:sldMk cId="2974123424" sldId="263"/>
+            <ac:spMk id="3" creationId="{9E5E3660-B1B0-863C-4590-7FA0B91F7D8C}"/>
           </ac:spMkLst>
         </pc:spChg>
       </pc:sldChg>
-      <pc:sldChg chg="modSp mod modClrScheme chgLayout">
-        <pc:chgData name="Mrinav Saxena" userId="1ae1cb636c956b49" providerId="LiveId" clId="{AD516D71-32E7-414E-95C0-D496F34FCB5E}" dt="2025-08-31T05:58:52.628" v="351" actId="20577"/>
+      <pc:sldChg chg="addSp delSp modSp new mod modClrScheme chgLayout">
+        <pc:chgData name="Mrinav Saxena" userId="1ae1cb636c956b49" providerId="LiveId" clId="{A2E5E654-390A-46A7-A8C6-614B0BD28A59}" dt="2025-09-04T17:31:49.156" v="2924" actId="20577"/>
         <pc:sldMkLst>
           <pc:docMk/>
-          <pc:sldMk cId="351193495" sldId="258"/>
+          <pc:sldMk cId="2988230929" sldId="264"/>
         </pc:sldMkLst>
-        <pc:spChg chg="mod ord">
-          <ac:chgData name="Mrinav Saxena" userId="1ae1cb636c956b49" providerId="LiveId" clId="{AD516D71-32E7-414E-95C0-D496F34FCB5E}" dt="2025-08-31T05:58:52.628" v="351" actId="20577"/>
+        <pc:spChg chg="del mod ord">
+          <ac:chgData name="Mrinav Saxena" userId="1ae1cb636c956b49" providerId="LiveId" clId="{A2E5E654-390A-46A7-A8C6-614B0BD28A59}" dt="2025-09-03T17:34:37.079" v="2463" actId="700"/>
           <ac:spMkLst>
             <pc:docMk/>
-            <pc:sldMk cId="351193495" sldId="258"/>
-            <ac:spMk id="2" creationId="{5853928D-293A-1110-D245-24866279E059}"/>
+            <pc:sldMk cId="2988230929" sldId="264"/>
+            <ac:spMk id="2" creationId="{65D89EE9-5B3C-9A36-082D-A7860E8CC707}"/>
           </ac:spMkLst>
         </pc:spChg>
-        <pc:spChg chg="mod ord">
-          <ac:chgData name="Mrinav Saxena" userId="1ae1cb636c956b49" providerId="LiveId" clId="{AD516D71-32E7-414E-95C0-D496F34FCB5E}" dt="2025-08-30T13:56:00.472" v="316" actId="20577"/>
+        <pc:spChg chg="del mod ord">
+          <ac:chgData name="Mrinav Saxena" userId="1ae1cb636c956b49" providerId="LiveId" clId="{A2E5E654-390A-46A7-A8C6-614B0BD28A59}" dt="2025-09-03T17:34:37.079" v="2463" actId="700"/>
           <ac:spMkLst>
             <pc:docMk/>
-            <pc:sldMk cId="351193495" sldId="258"/>
-            <ac:spMk id="3" creationId="{CB6A7330-F609-B790-6941-5F8433E1724E}"/>
+            <pc:sldMk cId="2988230929" sldId="264"/>
+            <ac:spMk id="3" creationId="{FE13605A-C43E-4880-8AB6-D316EB42E4B9}"/>
+          </ac:spMkLst>
+        </pc:spChg>
+        <pc:spChg chg="add mod ord">
+          <ac:chgData name="Mrinav Saxena" userId="1ae1cb636c956b49" providerId="LiveId" clId="{A2E5E654-390A-46A7-A8C6-614B0BD28A59}" dt="2025-09-03T17:35:06.546" v="2466" actId="20577"/>
+          <ac:spMkLst>
+            <pc:docMk/>
+            <pc:sldMk cId="2988230929" sldId="264"/>
+            <ac:spMk id="4" creationId="{CBDFBB19-9E5B-A3F1-6C30-618BEBD0074C}"/>
+          </ac:spMkLst>
+        </pc:spChg>
+        <pc:spChg chg="add mod ord">
+          <ac:chgData name="Mrinav Saxena" userId="1ae1cb636c956b49" providerId="LiveId" clId="{A2E5E654-390A-46A7-A8C6-614B0BD28A59}" dt="2025-09-04T17:31:49.156" v="2924" actId="20577"/>
+          <ac:spMkLst>
+            <pc:docMk/>
+            <pc:sldMk cId="2988230929" sldId="264"/>
+            <ac:spMk id="5" creationId="{1A5A8427-A94F-8387-AA02-5D06EEAC6365}"/>
           </ac:spMkLst>
         </pc:spChg>
       </pc:sldChg>
-      <pc:sldChg chg="modSp mod modClrScheme chgLayout">
-        <pc:chgData name="Mrinav Saxena" userId="1ae1cb636c956b49" providerId="LiveId" clId="{AD516D71-32E7-414E-95C0-D496F34FCB5E}" dt="2025-08-31T05:58:57.106" v="359" actId="20577"/>
-        <pc:sldMkLst>
-          <pc:docMk/>
-          <pc:sldMk cId="3989451944" sldId="259"/>
-        </pc:sldMkLst>
-        <pc:spChg chg="mod ord">
-          <ac:chgData name="Mrinav Saxena" userId="1ae1cb636c956b49" providerId="LiveId" clId="{AD516D71-32E7-414E-95C0-D496F34FCB5E}" dt="2025-08-31T05:58:57.106" v="359" actId="20577"/>
-          <ac:spMkLst>
-            <pc:docMk/>
-            <pc:sldMk cId="3989451944" sldId="259"/>
-            <ac:spMk id="2" creationId="{93B6BC5F-53FE-4AC4-1763-09275CE2E0F1}"/>
-          </ac:spMkLst>
-        </pc:spChg>
-        <pc:spChg chg="mod ord">
-          <ac:chgData name="Mrinav Saxena" userId="1ae1cb636c956b49" providerId="LiveId" clId="{AD516D71-32E7-414E-95C0-D496F34FCB5E}" dt="2025-08-30T11:31:08.173" v="205" actId="20577"/>
-          <ac:spMkLst>
-            <pc:docMk/>
-            <pc:sldMk cId="3989451944" sldId="259"/>
-            <ac:spMk id="3" creationId="{E0110169-424B-8AB4-C412-9ED89794D752}"/>
-          </ac:spMkLst>
-        </pc:spChg>
-      </pc:sldChg>
-      <pc:sldChg chg="modSp mod modClrScheme chgLayout">
-        <pc:chgData name="Mrinav Saxena" userId="1ae1cb636c956b49" providerId="LiveId" clId="{AD516D71-32E7-414E-95C0-D496F34FCB5E}" dt="2025-08-30T11:35:34.567" v="301" actId="14100"/>
-        <pc:sldMkLst>
-          <pc:docMk/>
-          <pc:sldMk cId="3171463036" sldId="260"/>
-        </pc:sldMkLst>
-        <pc:spChg chg="mod ord">
-          <ac:chgData name="Mrinav Saxena" userId="1ae1cb636c956b49" providerId="LiveId" clId="{AD516D71-32E7-414E-95C0-D496F34FCB5E}" dt="2025-08-30T11:27:38.996" v="169" actId="700"/>
-          <ac:spMkLst>
-            <pc:docMk/>
-            <pc:sldMk cId="3171463036" sldId="260"/>
-            <ac:spMk id="2" creationId="{7AD485E7-5C95-BFBB-C7EB-75A83227B8BC}"/>
-          </ac:spMkLst>
-        </pc:spChg>
-        <pc:spChg chg="mod ord">
-          <ac:chgData name="Mrinav Saxena" userId="1ae1cb636c956b49" providerId="LiveId" clId="{AD516D71-32E7-414E-95C0-D496F34FCB5E}" dt="2025-08-30T11:33:23.205" v="288" actId="20577"/>
-          <ac:spMkLst>
-            <pc:docMk/>
-            <pc:sldMk cId="3171463036" sldId="260"/>
-            <ac:spMk id="3" creationId="{B58E06C9-4467-CD3D-CA1F-94F0F2AD1E58}"/>
-          </ac:spMkLst>
-        </pc:spChg>
-        <pc:cxnChg chg="mod">
-          <ac:chgData name="Mrinav Saxena" userId="1ae1cb636c956b49" providerId="LiveId" clId="{AD516D71-32E7-414E-95C0-D496F34FCB5E}" dt="2025-08-30T11:35:00.592" v="295" actId="14100"/>
-          <ac:cxnSpMkLst>
-            <pc:docMk/>
-            <pc:sldMk cId="3171463036" sldId="260"/>
-            <ac:cxnSpMk id="5" creationId="{B317E3BB-9813-7C2A-3F3F-5EAB21F0F265}"/>
-          </ac:cxnSpMkLst>
-        </pc:cxnChg>
-        <pc:cxnChg chg="mod">
-          <ac:chgData name="Mrinav Saxena" userId="1ae1cb636c956b49" providerId="LiveId" clId="{AD516D71-32E7-414E-95C0-D496F34FCB5E}" dt="2025-08-30T11:35:34.567" v="301" actId="14100"/>
-          <ac:cxnSpMkLst>
-            <pc:docMk/>
-            <pc:sldMk cId="3171463036" sldId="260"/>
-            <ac:cxnSpMk id="7" creationId="{FC9354AF-8395-B362-A862-34C0753CB934}"/>
-          </ac:cxnSpMkLst>
-        </pc:cxnChg>
-      </pc:sldChg>
-      <pc:sldChg chg="addSp delSp modSp new mod modClrScheme chgLayout">
-        <pc:chgData name="Mrinav Saxena" userId="1ae1cb636c956b49" providerId="LiveId" clId="{AD516D71-32E7-414E-95C0-D496F34FCB5E}" dt="2025-08-31T06:00:44.151" v="379" actId="20577"/>
-        <pc:sldMkLst>
-          <pc:docMk/>
-          <pc:sldMk cId="1431337137" sldId="261"/>
-        </pc:sldMkLst>
-        <pc:spChg chg="del mod ord">
-          <ac:chgData name="Mrinav Saxena" userId="1ae1cb636c956b49" providerId="LiveId" clId="{AD516D71-32E7-414E-95C0-D496F34FCB5E}" dt="2025-08-31T05:58:39.341" v="318" actId="700"/>
-          <ac:spMkLst>
-            <pc:docMk/>
-            <pc:sldMk cId="1431337137" sldId="261"/>
-            <ac:spMk id="2" creationId="{FF7AB5A8-CD61-A604-E662-65FC1D51E058}"/>
-          </ac:spMkLst>
-        </pc:spChg>
-        <pc:spChg chg="del mod ord">
-          <ac:chgData name="Mrinav Saxena" userId="1ae1cb636c956b49" providerId="LiveId" clId="{AD516D71-32E7-414E-95C0-D496F34FCB5E}" dt="2025-08-31T05:58:39.341" v="318" actId="700"/>
-          <ac:spMkLst>
-            <pc:docMk/>
-            <pc:sldMk cId="1431337137" sldId="261"/>
-            <ac:spMk id="3" creationId="{495C4438-8484-C4C4-B5B7-20CA632364AC}"/>
-          </ac:spMkLst>
-        </pc:spChg>
-        <pc:spChg chg="add mod ord">
-          <ac:chgData name="Mrinav Saxena" userId="1ae1cb636c956b49" providerId="LiveId" clId="{AD516D71-32E7-414E-95C0-D496F34FCB5E}" dt="2025-08-31T05:59:03.645" v="375" actId="20577"/>
-          <ac:spMkLst>
-            <pc:docMk/>
-            <pc:sldMk cId="1431337137" sldId="261"/>
-            <ac:spMk id="4" creationId="{C1909BB4-5187-B06F-B493-9586FAD68DC6}"/>
-          </ac:spMkLst>
-        </pc:spChg>
-        <pc:spChg chg="add mod ord">
-          <ac:chgData name="Mrinav Saxena" userId="1ae1cb636c956b49" providerId="LiveId" clId="{AD516D71-32E7-414E-95C0-D496F34FCB5E}" dt="2025-08-31T06:00:44.151" v="379" actId="20577"/>
-          <ac:spMkLst>
-            <pc:docMk/>
-            <pc:sldMk cId="1431337137" sldId="261"/>
-            <ac:spMk id="5" creationId="{70F7BD49-804D-739A-58E3-141DB9312BC1}"/>
-          </ac:spMkLst>
-        </pc:spChg>
-      </pc:sldChg>
-      <pc:sldMasterChg chg="modSldLayout">
-        <pc:chgData name="Mrinav Saxena" userId="1ae1cb636c956b49" providerId="LiveId" clId="{AD516D71-32E7-414E-95C0-D496F34FCB5E}" dt="2025-08-30T11:28:13.613" v="170" actId="207"/>
-        <pc:sldMasterMkLst>
-          <pc:docMk/>
-          <pc:sldMasterMk cId="1641417551" sldId="2147483708"/>
-        </pc:sldMasterMkLst>
-        <pc:sldLayoutChg chg="modSp mod">
-          <pc:chgData name="Mrinav Saxena" userId="1ae1cb636c956b49" providerId="LiveId" clId="{AD516D71-32E7-414E-95C0-D496F34FCB5E}" dt="2025-08-30T11:28:13.613" v="170" actId="207"/>
-          <pc:sldLayoutMkLst>
-            <pc:docMk/>
-            <pc:sldMasterMk cId="1641417551" sldId="2147483708"/>
-            <pc:sldLayoutMk cId="3100346563" sldId="2147483709"/>
-          </pc:sldLayoutMkLst>
-          <pc:spChg chg="mod">
-            <ac:chgData name="Mrinav Saxena" userId="1ae1cb636c956b49" providerId="LiveId" clId="{AD516D71-32E7-414E-95C0-D496F34FCB5E}" dt="2025-08-30T11:28:13.613" v="170" actId="207"/>
-            <ac:spMkLst>
-              <pc:docMk/>
-              <pc:sldMasterMk cId="1641417551" sldId="2147483708"/>
-              <pc:sldLayoutMk cId="3100346563" sldId="2147483709"/>
-              <ac:spMk id="39" creationId="{00000000-0000-0000-0000-000000000000}"/>
-            </ac:spMkLst>
-          </pc:spChg>
-          <pc:spChg chg="mod">
-            <ac:chgData name="Mrinav Saxena" userId="1ae1cb636c956b49" providerId="LiveId" clId="{AD516D71-32E7-414E-95C0-D496F34FCB5E}" dt="2025-08-30T11:28:13.613" v="170" actId="207"/>
-            <ac:spMkLst>
-              <pc:docMk/>
-              <pc:sldMasterMk cId="1641417551" sldId="2147483708"/>
-              <pc:sldLayoutMk cId="3100346563" sldId="2147483709"/>
-              <ac:spMk id="40" creationId="{00000000-0000-0000-0000-000000000000}"/>
-            </ac:spMkLst>
-          </pc:spChg>
-          <pc:spChg chg="mod">
-            <ac:chgData name="Mrinav Saxena" userId="1ae1cb636c956b49" providerId="LiveId" clId="{AD516D71-32E7-414E-95C0-D496F34FCB5E}" dt="2025-08-30T11:28:13.613" v="170" actId="207"/>
-            <ac:spMkLst>
-              <pc:docMk/>
-              <pc:sldMasterMk cId="1641417551" sldId="2147483708"/>
-              <pc:sldLayoutMk cId="3100346563" sldId="2147483709"/>
-              <ac:spMk id="41" creationId="{00000000-0000-0000-0000-000000000000}"/>
-            </ac:spMkLst>
-          </pc:spChg>
-          <pc:grpChg chg="mod">
-            <ac:chgData name="Mrinav Saxena" userId="1ae1cb636c956b49" providerId="LiveId" clId="{AD516D71-32E7-414E-95C0-D496F34FCB5E}" dt="2025-08-30T11:28:13.613" v="170" actId="207"/>
-            <ac:grpSpMkLst>
-              <pc:docMk/>
-              <pc:sldMasterMk cId="1641417551" sldId="2147483708"/>
-              <pc:sldLayoutMk cId="3100346563" sldId="2147483709"/>
-              <ac:grpSpMk id="9" creationId="{00000000-0000-0000-0000-000000000000}"/>
-            </ac:grpSpMkLst>
-          </pc:grpChg>
-        </pc:sldLayoutChg>
-        <pc:sldLayoutChg chg="modSp mod">
-          <pc:chgData name="Mrinav Saxena" userId="1ae1cb636c956b49" providerId="LiveId" clId="{AD516D71-32E7-414E-95C0-D496F34FCB5E}" dt="2025-08-30T11:15:54.773" v="45" actId="207"/>
-          <pc:sldLayoutMkLst>
-            <pc:docMk/>
-            <pc:sldMasterMk cId="1641417551" sldId="2147483708"/>
-            <pc:sldLayoutMk cId="4124378714" sldId="2147483720"/>
-          </pc:sldLayoutMkLst>
-          <pc:spChg chg="mod">
-            <ac:chgData name="Mrinav Saxena" userId="1ae1cb636c956b49" providerId="LiveId" clId="{AD516D71-32E7-414E-95C0-D496F34FCB5E}" dt="2025-08-30T11:15:54.773" v="45" actId="207"/>
-            <ac:spMkLst>
-              <pc:docMk/>
-              <pc:sldMasterMk cId="1641417551" sldId="2147483708"/>
-              <pc:sldLayoutMk cId="4124378714" sldId="2147483720"/>
-              <ac:spMk id="2" creationId="{00000000-0000-0000-0000-000000000000}"/>
-            </ac:spMkLst>
-          </pc:spChg>
-          <pc:spChg chg="mod">
-            <ac:chgData name="Mrinav Saxena" userId="1ae1cb636c956b49" providerId="LiveId" clId="{AD516D71-32E7-414E-95C0-D496F34FCB5E}" dt="2025-08-30T11:15:54.773" v="45" actId="207"/>
-            <ac:spMkLst>
-              <pc:docMk/>
-              <pc:sldMasterMk cId="1641417551" sldId="2147483708"/>
-              <pc:sldLayoutMk cId="4124378714" sldId="2147483720"/>
-              <ac:spMk id="28" creationId="{00000000-0000-0000-0000-000000000000}"/>
-            </ac:spMkLst>
-          </pc:spChg>
-          <pc:spChg chg="mod">
-            <ac:chgData name="Mrinav Saxena" userId="1ae1cb636c956b49" providerId="LiveId" clId="{AD516D71-32E7-414E-95C0-D496F34FCB5E}" dt="2025-08-30T11:15:54.773" v="45" actId="207"/>
-            <ac:spMkLst>
-              <pc:docMk/>
-              <pc:sldMasterMk cId="1641417551" sldId="2147483708"/>
-              <pc:sldLayoutMk cId="4124378714" sldId="2147483720"/>
-              <ac:spMk id="29" creationId="{00000000-0000-0000-0000-000000000000}"/>
-            </ac:spMkLst>
-          </pc:spChg>
-          <pc:spChg chg="mod">
-            <ac:chgData name="Mrinav Saxena" userId="1ae1cb636c956b49" providerId="LiveId" clId="{AD516D71-32E7-414E-95C0-D496F34FCB5E}" dt="2025-08-30T11:15:54.773" v="45" actId="207"/>
-            <ac:spMkLst>
-              <pc:docMk/>
-              <pc:sldMasterMk cId="1641417551" sldId="2147483708"/>
-              <pc:sldLayoutMk cId="4124378714" sldId="2147483720"/>
-              <ac:spMk id="30" creationId="{00000000-0000-0000-0000-000000000000}"/>
-            </ac:spMkLst>
-          </pc:spChg>
-          <pc:grpChg chg="mod">
-            <ac:chgData name="Mrinav Saxena" userId="1ae1cb636c956b49" providerId="LiveId" clId="{AD516D71-32E7-414E-95C0-D496F34FCB5E}" dt="2025-08-30T11:15:54.773" v="45" actId="207"/>
-            <ac:grpSpMkLst>
-              <pc:docMk/>
-              <pc:sldMasterMk cId="1641417551" sldId="2147483708"/>
-              <pc:sldLayoutMk cId="4124378714" sldId="2147483720"/>
-              <ac:grpSpMk id="27" creationId="{00000000-0000-0000-0000-000000000000}"/>
-            </ac:grpSpMkLst>
-          </pc:grpChg>
-        </pc:sldLayoutChg>
-        <pc:sldLayoutChg chg="modSp mod">
-          <pc:chgData name="Mrinav Saxena" userId="1ae1cb636c956b49" providerId="LiveId" clId="{AD516D71-32E7-414E-95C0-D496F34FCB5E}" dt="2025-08-30T11:17:07.442" v="50" actId="207"/>
-          <pc:sldLayoutMkLst>
-            <pc:docMk/>
-            <pc:sldMasterMk cId="1641417551" sldId="2147483708"/>
-            <pc:sldLayoutMk cId="773196241" sldId="2147483721"/>
-          </pc:sldLayoutMkLst>
-          <pc:spChg chg="mod">
-            <ac:chgData name="Mrinav Saxena" userId="1ae1cb636c956b49" providerId="LiveId" clId="{AD516D71-32E7-414E-95C0-D496F34FCB5E}" dt="2025-08-30T11:17:07.442" v="50" actId="207"/>
-            <ac:spMkLst>
-              <pc:docMk/>
-              <pc:sldMasterMk cId="1641417551" sldId="2147483708"/>
-              <pc:sldLayoutMk cId="773196241" sldId="2147483721"/>
-              <ac:spMk id="2" creationId="{00000000-0000-0000-0000-000000000000}"/>
-            </ac:spMkLst>
-          </pc:spChg>
-          <pc:spChg chg="mod">
-            <ac:chgData name="Mrinav Saxena" userId="1ae1cb636c956b49" providerId="LiveId" clId="{AD516D71-32E7-414E-95C0-D496F34FCB5E}" dt="2025-08-30T11:16:55.409" v="48" actId="207"/>
-            <ac:spMkLst>
-              <pc:docMk/>
-              <pc:sldMasterMk cId="1641417551" sldId="2147483708"/>
-              <pc:sldLayoutMk cId="773196241" sldId="2147483721"/>
-              <ac:spMk id="28" creationId="{00000000-0000-0000-0000-000000000000}"/>
-            </ac:spMkLst>
-          </pc:spChg>
-          <pc:spChg chg="mod">
-            <ac:chgData name="Mrinav Saxena" userId="1ae1cb636c956b49" providerId="LiveId" clId="{AD516D71-32E7-414E-95C0-D496F34FCB5E}" dt="2025-08-30T11:16:55.409" v="48" actId="207"/>
-            <ac:spMkLst>
-              <pc:docMk/>
-              <pc:sldMasterMk cId="1641417551" sldId="2147483708"/>
-              <pc:sldLayoutMk cId="773196241" sldId="2147483721"/>
-              <ac:spMk id="29" creationId="{00000000-0000-0000-0000-000000000000}"/>
-            </ac:spMkLst>
-          </pc:spChg>
-          <pc:spChg chg="mod">
-            <ac:chgData name="Mrinav Saxena" userId="1ae1cb636c956b49" providerId="LiveId" clId="{AD516D71-32E7-414E-95C0-D496F34FCB5E}" dt="2025-08-30T11:16:55.409" v="48" actId="207"/>
-            <ac:spMkLst>
-              <pc:docMk/>
-              <pc:sldMasterMk cId="1641417551" sldId="2147483708"/>
-              <pc:sldLayoutMk cId="773196241" sldId="2147483721"/>
-              <ac:spMk id="30" creationId="{00000000-0000-0000-0000-000000000000}"/>
-            </ac:spMkLst>
-          </pc:spChg>
-          <pc:grpChg chg="mod">
-            <ac:chgData name="Mrinav Saxena" userId="1ae1cb636c956b49" providerId="LiveId" clId="{AD516D71-32E7-414E-95C0-D496F34FCB5E}" dt="2025-08-30T11:16:55.409" v="48" actId="207"/>
-            <ac:grpSpMkLst>
-              <pc:docMk/>
-              <pc:sldMasterMk cId="1641417551" sldId="2147483708"/>
-              <pc:sldLayoutMk cId="773196241" sldId="2147483721"/>
-              <ac:grpSpMk id="27" creationId="{00000000-0000-0000-0000-000000000000}"/>
-            </ac:grpSpMkLst>
-          </pc:grpChg>
-        </pc:sldLayoutChg>
-      </pc:sldMasterChg>
-      <pc:sldMasterChg chg="new del mod addSldLayout delSldLayout">
-        <pc:chgData name="Mrinav Saxena" userId="1ae1cb636c956b49" providerId="LiveId" clId="{AD516D71-32E7-414E-95C0-D496F34FCB5E}" dt="2025-08-30T11:16:34.583" v="47" actId="6938"/>
-        <pc:sldMasterMkLst>
-          <pc:docMk/>
-          <pc:sldMasterMk cId="4213210236" sldId="2147483721"/>
-        </pc:sldMasterMkLst>
-        <pc:sldLayoutChg chg="new del replId">
-          <pc:chgData name="Mrinav Saxena" userId="1ae1cb636c956b49" providerId="LiveId" clId="{AD516D71-32E7-414E-95C0-D496F34FCB5E}" dt="2025-08-30T11:16:34.583" v="47" actId="6938"/>
-          <pc:sldLayoutMkLst>
-            <pc:docMk/>
-            <pc:sldMasterMk cId="4213210236" sldId="2147483721"/>
-            <pc:sldLayoutMk cId="3847759687" sldId="2147483722"/>
-          </pc:sldLayoutMkLst>
-        </pc:sldLayoutChg>
-        <pc:sldLayoutChg chg="new del replId">
-          <pc:chgData name="Mrinav Saxena" userId="1ae1cb636c956b49" providerId="LiveId" clId="{AD516D71-32E7-414E-95C0-D496F34FCB5E}" dt="2025-08-30T11:16:34.583" v="47" actId="6938"/>
-          <pc:sldLayoutMkLst>
-            <pc:docMk/>
-            <pc:sldMasterMk cId="4213210236" sldId="2147483721"/>
-            <pc:sldLayoutMk cId="3545587771" sldId="2147483723"/>
-          </pc:sldLayoutMkLst>
-        </pc:sldLayoutChg>
-        <pc:sldLayoutChg chg="new del replId">
-          <pc:chgData name="Mrinav Saxena" userId="1ae1cb636c956b49" providerId="LiveId" clId="{AD516D71-32E7-414E-95C0-D496F34FCB5E}" dt="2025-08-30T11:16:34.583" v="47" actId="6938"/>
-          <pc:sldLayoutMkLst>
-            <pc:docMk/>
-            <pc:sldMasterMk cId="4213210236" sldId="2147483721"/>
-            <pc:sldLayoutMk cId="547479702" sldId="2147483724"/>
-          </pc:sldLayoutMkLst>
-        </pc:sldLayoutChg>
-        <pc:sldLayoutChg chg="new del replId">
-          <pc:chgData name="Mrinav Saxena" userId="1ae1cb636c956b49" providerId="LiveId" clId="{AD516D71-32E7-414E-95C0-D496F34FCB5E}" dt="2025-08-30T11:16:34.583" v="47" actId="6938"/>
-          <pc:sldLayoutMkLst>
-            <pc:docMk/>
-            <pc:sldMasterMk cId="4213210236" sldId="2147483721"/>
-            <pc:sldLayoutMk cId="1771462346" sldId="2147483725"/>
-          </pc:sldLayoutMkLst>
-        </pc:sldLayoutChg>
-        <pc:sldLayoutChg chg="new del replId">
-          <pc:chgData name="Mrinav Saxena" userId="1ae1cb636c956b49" providerId="LiveId" clId="{AD516D71-32E7-414E-95C0-D496F34FCB5E}" dt="2025-08-30T11:16:34.583" v="47" actId="6938"/>
-          <pc:sldLayoutMkLst>
-            <pc:docMk/>
-            <pc:sldMasterMk cId="4213210236" sldId="2147483721"/>
-            <pc:sldLayoutMk cId="1177361971" sldId="2147483726"/>
-          </pc:sldLayoutMkLst>
-        </pc:sldLayoutChg>
-        <pc:sldLayoutChg chg="new del replId">
-          <pc:chgData name="Mrinav Saxena" userId="1ae1cb636c956b49" providerId="LiveId" clId="{AD516D71-32E7-414E-95C0-D496F34FCB5E}" dt="2025-08-30T11:16:34.583" v="47" actId="6938"/>
-          <pc:sldLayoutMkLst>
-            <pc:docMk/>
-            <pc:sldMasterMk cId="4213210236" sldId="2147483721"/>
-            <pc:sldLayoutMk cId="3435621860" sldId="2147483727"/>
-          </pc:sldLayoutMkLst>
-        </pc:sldLayoutChg>
-        <pc:sldLayoutChg chg="new del replId">
-          <pc:chgData name="Mrinav Saxena" userId="1ae1cb636c956b49" providerId="LiveId" clId="{AD516D71-32E7-414E-95C0-D496F34FCB5E}" dt="2025-08-30T11:16:34.583" v="47" actId="6938"/>
-          <pc:sldLayoutMkLst>
-            <pc:docMk/>
-            <pc:sldMasterMk cId="4213210236" sldId="2147483721"/>
-            <pc:sldLayoutMk cId="2115370862" sldId="2147483728"/>
-          </pc:sldLayoutMkLst>
-        </pc:sldLayoutChg>
-        <pc:sldLayoutChg chg="new del replId">
-          <pc:chgData name="Mrinav Saxena" userId="1ae1cb636c956b49" providerId="LiveId" clId="{AD516D71-32E7-414E-95C0-D496F34FCB5E}" dt="2025-08-30T11:16:34.583" v="47" actId="6938"/>
-          <pc:sldLayoutMkLst>
-            <pc:docMk/>
-            <pc:sldMasterMk cId="4213210236" sldId="2147483721"/>
-            <pc:sldLayoutMk cId="2992903118" sldId="2147483729"/>
-          </pc:sldLayoutMkLst>
-        </pc:sldLayoutChg>
-        <pc:sldLayoutChg chg="new del replId">
-          <pc:chgData name="Mrinav Saxena" userId="1ae1cb636c956b49" providerId="LiveId" clId="{AD516D71-32E7-414E-95C0-D496F34FCB5E}" dt="2025-08-30T11:16:34.583" v="47" actId="6938"/>
-          <pc:sldLayoutMkLst>
-            <pc:docMk/>
-            <pc:sldMasterMk cId="4213210236" sldId="2147483721"/>
-            <pc:sldLayoutMk cId="2710779252" sldId="2147483730"/>
-          </pc:sldLayoutMkLst>
-        </pc:sldLayoutChg>
-        <pc:sldLayoutChg chg="new del replId">
-          <pc:chgData name="Mrinav Saxena" userId="1ae1cb636c956b49" providerId="LiveId" clId="{AD516D71-32E7-414E-95C0-D496F34FCB5E}" dt="2025-08-30T11:16:34.583" v="47" actId="6938"/>
-          <pc:sldLayoutMkLst>
-            <pc:docMk/>
-            <pc:sldMasterMk cId="4213210236" sldId="2147483721"/>
-            <pc:sldLayoutMk cId="914516305" sldId="2147483731"/>
-          </pc:sldLayoutMkLst>
-        </pc:sldLayoutChg>
-        <pc:sldLayoutChg chg="new del replId">
-          <pc:chgData name="Mrinav Saxena" userId="1ae1cb636c956b49" providerId="LiveId" clId="{AD516D71-32E7-414E-95C0-D496F34FCB5E}" dt="2025-08-30T11:16:34.583" v="47" actId="6938"/>
-          <pc:sldLayoutMkLst>
-            <pc:docMk/>
-            <pc:sldMasterMk cId="4213210236" sldId="2147483721"/>
-            <pc:sldLayoutMk cId="3246214536" sldId="2147483732"/>
-          </pc:sldLayoutMkLst>
-        </pc:sldLayoutChg>
-      </pc:sldMasterChg>
     </pc:docChg>
   </pc:docChgLst>
 </pc:chgInfo>
+</file>
+
+<file path=ppt/notesMasters/notesMaster1.xml><?xml version="1.0" encoding="utf-8"?>
+<p:notesMaster xmlns:a="http://schemas.openxmlformats.org/drawingml/2006/main" xmlns:r="http://schemas.openxmlformats.org/officeDocument/2006/relationships" xmlns:p="http://schemas.openxmlformats.org/presentationml/2006/main">
+  <p:cSld>
+    <p:bg>
+      <p:bgRef idx="1001">
+        <a:schemeClr val="bg1"/>
+      </p:bgRef>
+    </p:bg>
+    <p:spTree>
+      <p:nvGrpSpPr>
+        <p:cNvPr id="1" name=""/>
+        <p:cNvGrpSpPr/>
+        <p:nvPr/>
+      </p:nvGrpSpPr>
+      <p:grpSpPr>
+        <a:xfrm>
+          <a:off x="0" y="0"/>
+          <a:ext cx="0" cy="0"/>
+          <a:chOff x="0" y="0"/>
+          <a:chExt cx="0" cy="0"/>
+        </a:xfrm>
+      </p:grpSpPr>
+      <p:sp>
+        <p:nvSpPr>
+          <p:cNvPr id="2" name="Header Placeholder 1"/>
+          <p:cNvSpPr>
+            <a:spLocks noGrp="1"/>
+          </p:cNvSpPr>
+          <p:nvPr>
+            <p:ph type="hdr" sz="quarter"/>
+          </p:nvPr>
+        </p:nvSpPr>
+        <p:spPr>
+          <a:xfrm>
+            <a:off x="0" y="0"/>
+            <a:ext cx="2971800" cy="458788"/>
+          </a:xfrm>
+          <a:prstGeom prst="rect">
+            <a:avLst/>
+          </a:prstGeom>
+        </p:spPr>
+        <p:txBody>
+          <a:bodyPr vert="horz" lIns="91440" tIns="45720" rIns="91440" bIns="45720" rtlCol="0"/>
+          <a:lstStyle>
+            <a:lvl1pPr algn="l">
+              <a:defRPr sz="1200"/>
+            </a:lvl1pPr>
+          </a:lstStyle>
+          <a:p>
+            <a:endParaRPr lang="en-IN"/>
+          </a:p>
+        </p:txBody>
+      </p:sp>
+      <p:sp>
+        <p:nvSpPr>
+          <p:cNvPr id="3" name="Date Placeholder 2"/>
+          <p:cNvSpPr>
+            <a:spLocks noGrp="1"/>
+          </p:cNvSpPr>
+          <p:nvPr>
+            <p:ph type="dt" idx="1"/>
+          </p:nvPr>
+        </p:nvSpPr>
+        <p:spPr>
+          <a:xfrm>
+            <a:off x="3884613" y="0"/>
+            <a:ext cx="2971800" cy="458788"/>
+          </a:xfrm>
+          <a:prstGeom prst="rect">
+            <a:avLst/>
+          </a:prstGeom>
+        </p:spPr>
+        <p:txBody>
+          <a:bodyPr vert="horz" lIns="91440" tIns="45720" rIns="91440" bIns="45720" rtlCol="0"/>
+          <a:lstStyle>
+            <a:lvl1pPr algn="r">
+              <a:defRPr sz="1200"/>
+            </a:lvl1pPr>
+          </a:lstStyle>
+          <a:p>
+            <a:fld id="{ABA18496-2C08-4E1B-8E2C-B9C3C1BFD0C6}" type="datetimeFigureOut">
+              <a:rPr lang="en-IN" smtClean="0"/>
+              <a:t>03-09-2025</a:t>
+            </a:fld>
+            <a:endParaRPr lang="en-IN"/>
+          </a:p>
+        </p:txBody>
+      </p:sp>
+      <p:sp>
+        <p:nvSpPr>
+          <p:cNvPr id="4" name="Slide Image Placeholder 3"/>
+          <p:cNvSpPr>
+            <a:spLocks noGrp="1" noRot="1" noChangeAspect="1"/>
+          </p:cNvSpPr>
+          <p:nvPr>
+            <p:ph type="sldImg" idx="2"/>
+          </p:nvPr>
+        </p:nvSpPr>
+        <p:spPr>
+          <a:xfrm>
+            <a:off x="685800" y="1143000"/>
+            <a:ext cx="5486400" cy="3086100"/>
+          </a:xfrm>
+          <a:prstGeom prst="rect">
+            <a:avLst/>
+          </a:prstGeom>
+          <a:noFill/>
+          <a:ln w="12700">
+            <a:solidFill>
+              <a:prstClr val="black"/>
+            </a:solidFill>
+          </a:ln>
+        </p:spPr>
+        <p:txBody>
+          <a:bodyPr vert="horz" lIns="91440" tIns="45720" rIns="91440" bIns="45720" rtlCol="0" anchor="ctr"/>
+          <a:lstStyle/>
+          <a:p>
+            <a:endParaRPr lang="en-IN"/>
+          </a:p>
+        </p:txBody>
+      </p:sp>
+      <p:sp>
+        <p:nvSpPr>
+          <p:cNvPr id="5" name="Notes Placeholder 4"/>
+          <p:cNvSpPr>
+            <a:spLocks noGrp="1"/>
+          </p:cNvSpPr>
+          <p:nvPr>
+            <p:ph type="body" sz="quarter" idx="3"/>
+          </p:nvPr>
+        </p:nvSpPr>
+        <p:spPr>
+          <a:xfrm>
+            <a:off x="685800" y="4400550"/>
+            <a:ext cx="5486400" cy="3600450"/>
+          </a:xfrm>
+          <a:prstGeom prst="rect">
+            <a:avLst/>
+          </a:prstGeom>
+        </p:spPr>
+        <p:txBody>
+          <a:bodyPr vert="horz" lIns="91440" tIns="45720" rIns="91440" bIns="45720" rtlCol="0"/>
+          <a:lstStyle/>
+          <a:p>
+            <a:pPr lvl="0"/>
+            <a:r>
+              <a:rPr lang="en-US"/>
+              <a:t>Click to edit Master text styles</a:t>
+            </a:r>
+          </a:p>
+          <a:p>
+            <a:pPr lvl="1"/>
+            <a:r>
+              <a:rPr lang="en-US"/>
+              <a:t>Second level</a:t>
+            </a:r>
+          </a:p>
+          <a:p>
+            <a:pPr lvl="2"/>
+            <a:r>
+              <a:rPr lang="en-US"/>
+              <a:t>Third level</a:t>
+            </a:r>
+          </a:p>
+          <a:p>
+            <a:pPr lvl="3"/>
+            <a:r>
+              <a:rPr lang="en-US"/>
+              <a:t>Fourth level</a:t>
+            </a:r>
+          </a:p>
+          <a:p>
+            <a:pPr lvl="4"/>
+            <a:r>
+              <a:rPr lang="en-US"/>
+              <a:t>Fifth level</a:t>
+            </a:r>
+            <a:endParaRPr lang="en-IN"/>
+          </a:p>
+        </p:txBody>
+      </p:sp>
+      <p:sp>
+        <p:nvSpPr>
+          <p:cNvPr id="6" name="Footer Placeholder 5"/>
+          <p:cNvSpPr>
+            <a:spLocks noGrp="1"/>
+          </p:cNvSpPr>
+          <p:nvPr>
+            <p:ph type="ftr" sz="quarter" idx="4"/>
+          </p:nvPr>
+        </p:nvSpPr>
+        <p:spPr>
+          <a:xfrm>
+            <a:off x="0" y="8685213"/>
+            <a:ext cx="2971800" cy="458787"/>
+          </a:xfrm>
+          <a:prstGeom prst="rect">
+            <a:avLst/>
+          </a:prstGeom>
+        </p:spPr>
+        <p:txBody>
+          <a:bodyPr vert="horz" lIns="91440" tIns="45720" rIns="91440" bIns="45720" rtlCol="0" anchor="b"/>
+          <a:lstStyle>
+            <a:lvl1pPr algn="l">
+              <a:defRPr sz="1200"/>
+            </a:lvl1pPr>
+          </a:lstStyle>
+          <a:p>
+            <a:endParaRPr lang="en-IN"/>
+          </a:p>
+        </p:txBody>
+      </p:sp>
+      <p:sp>
+        <p:nvSpPr>
+          <p:cNvPr id="7" name="Slide Number Placeholder 6"/>
+          <p:cNvSpPr>
+            <a:spLocks noGrp="1"/>
+          </p:cNvSpPr>
+          <p:nvPr>
+            <p:ph type="sldNum" sz="quarter" idx="5"/>
+          </p:nvPr>
+        </p:nvSpPr>
+        <p:spPr>
+          <a:xfrm>
+            <a:off x="3884613" y="8685213"/>
+            <a:ext cx="2971800" cy="458787"/>
+          </a:xfrm>
+          <a:prstGeom prst="rect">
+            <a:avLst/>
+          </a:prstGeom>
+        </p:spPr>
+        <p:txBody>
+          <a:bodyPr vert="horz" lIns="91440" tIns="45720" rIns="91440" bIns="45720" rtlCol="0" anchor="b"/>
+          <a:lstStyle>
+            <a:lvl1pPr algn="r">
+              <a:defRPr sz="1200"/>
+            </a:lvl1pPr>
+          </a:lstStyle>
+          <a:p>
+            <a:fld id="{9705557C-6348-43CC-A73A-4CBAAF49F69E}" type="slidenum">
+              <a:rPr lang="en-IN" smtClean="0"/>
+              <a:t>‹#›</a:t>
+            </a:fld>
+            <a:endParaRPr lang="en-IN"/>
+          </a:p>
+        </p:txBody>
+      </p:sp>
+    </p:spTree>
+    <p:extLst>
+      <p:ext uri="{BB962C8B-B14F-4D97-AF65-F5344CB8AC3E}">
+        <p14:creationId xmlns:p14="http://schemas.microsoft.com/office/powerpoint/2010/main" val="280268565"/>
+      </p:ext>
+    </p:extLst>
+  </p:cSld>
+  <p:clrMap bg1="lt1" tx1="dk1" bg2="lt2" tx2="dk2" accent1="accent1" accent2="accent2" accent3="accent3" accent4="accent4" accent5="accent5" accent6="accent6" hlink="hlink" folHlink="folHlink"/>
+  <p:notesStyle>
+    <a:lvl1pPr marL="0" algn="l" defTabSz="914400" rtl="0" eaLnBrk="1" latinLnBrk="0" hangingPunct="1">
+      <a:defRPr sz="1200" kern="1200">
+        <a:solidFill>
+          <a:schemeClr val="tx1"/>
+        </a:solidFill>
+        <a:latin typeface="+mn-lt"/>
+        <a:ea typeface="+mn-ea"/>
+        <a:cs typeface="+mn-cs"/>
+      </a:defRPr>
+    </a:lvl1pPr>
+    <a:lvl2pPr marL="457200" algn="l" defTabSz="914400" rtl="0" eaLnBrk="1" latinLnBrk="0" hangingPunct="1">
+      <a:defRPr sz="1200" kern="1200">
+        <a:solidFill>
+          <a:schemeClr val="tx1"/>
+        </a:solidFill>
+        <a:latin typeface="+mn-lt"/>
+        <a:ea typeface="+mn-ea"/>
+        <a:cs typeface="+mn-cs"/>
+      </a:defRPr>
+    </a:lvl2pPr>
+    <a:lvl3pPr marL="914400" algn="l" defTabSz="914400" rtl="0" eaLnBrk="1" latinLnBrk="0" hangingPunct="1">
+      <a:defRPr sz="1200" kern="1200">
+        <a:solidFill>
+          <a:schemeClr val="tx1"/>
+        </a:solidFill>
+        <a:latin typeface="+mn-lt"/>
+        <a:ea typeface="+mn-ea"/>
+        <a:cs typeface="+mn-cs"/>
+      </a:defRPr>
+    </a:lvl3pPr>
+    <a:lvl4pPr marL="1371600" algn="l" defTabSz="914400" rtl="0" eaLnBrk="1" latinLnBrk="0" hangingPunct="1">
+      <a:defRPr sz="1200" kern="1200">
+        <a:solidFill>
+          <a:schemeClr val="tx1"/>
+        </a:solidFill>
+        <a:latin typeface="+mn-lt"/>
+        <a:ea typeface="+mn-ea"/>
+        <a:cs typeface="+mn-cs"/>
+      </a:defRPr>
+    </a:lvl4pPr>
+    <a:lvl5pPr marL="1828800" algn="l" defTabSz="914400" rtl="0" eaLnBrk="1" latinLnBrk="0" hangingPunct="1">
+      <a:defRPr sz="1200" kern="1200">
+        <a:solidFill>
+          <a:schemeClr val="tx1"/>
+        </a:solidFill>
+        <a:latin typeface="+mn-lt"/>
+        <a:ea typeface="+mn-ea"/>
+        <a:cs typeface="+mn-cs"/>
+      </a:defRPr>
+    </a:lvl5pPr>
+    <a:lvl6pPr marL="2286000" algn="l" defTabSz="914400" rtl="0" eaLnBrk="1" latinLnBrk="0" hangingPunct="1">
+      <a:defRPr sz="1200" kern="1200">
+        <a:solidFill>
+          <a:schemeClr val="tx1"/>
+        </a:solidFill>
+        <a:latin typeface="+mn-lt"/>
+        <a:ea typeface="+mn-ea"/>
+        <a:cs typeface="+mn-cs"/>
+      </a:defRPr>
+    </a:lvl6pPr>
+    <a:lvl7pPr marL="2743200" algn="l" defTabSz="914400" rtl="0" eaLnBrk="1" latinLnBrk="0" hangingPunct="1">
+      <a:defRPr sz="1200" kern="1200">
+        <a:solidFill>
+          <a:schemeClr val="tx1"/>
+        </a:solidFill>
+        <a:latin typeface="+mn-lt"/>
+        <a:ea typeface="+mn-ea"/>
+        <a:cs typeface="+mn-cs"/>
+      </a:defRPr>
+    </a:lvl7pPr>
+    <a:lvl8pPr marL="3200400" algn="l" defTabSz="914400" rtl="0" eaLnBrk="1" latinLnBrk="0" hangingPunct="1">
+      <a:defRPr sz="1200" kern="1200">
+        <a:solidFill>
+          <a:schemeClr val="tx1"/>
+        </a:solidFill>
+        <a:latin typeface="+mn-lt"/>
+        <a:ea typeface="+mn-ea"/>
+        <a:cs typeface="+mn-cs"/>
+      </a:defRPr>
+    </a:lvl8pPr>
+    <a:lvl9pPr marL="3657600" algn="l" defTabSz="914400" rtl="0" eaLnBrk="1" latinLnBrk="0" hangingPunct="1">
+      <a:defRPr sz="1200" kern="1200">
+        <a:solidFill>
+          <a:schemeClr val="tx1"/>
+        </a:solidFill>
+        <a:latin typeface="+mn-lt"/>
+        <a:ea typeface="+mn-ea"/>
+        <a:cs typeface="+mn-cs"/>
+      </a:defRPr>
+    </a:lvl9pPr>
+  </p:notesStyle>
+</p:notesMaster>
+</file>
+
+<file path=ppt/notesSlides/notesSlide1.xml><?xml version="1.0" encoding="utf-8"?>
+<p:notes xmlns:a="http://schemas.openxmlformats.org/drawingml/2006/main" xmlns:r="http://schemas.openxmlformats.org/officeDocument/2006/relationships" xmlns:p="http://schemas.openxmlformats.org/presentationml/2006/main">
+  <p:cSld>
+    <p:spTree>
+      <p:nvGrpSpPr>
+        <p:cNvPr id="1" name=""/>
+        <p:cNvGrpSpPr/>
+        <p:nvPr/>
+      </p:nvGrpSpPr>
+      <p:grpSpPr>
+        <a:xfrm>
+          <a:off x="0" y="0"/>
+          <a:ext cx="0" cy="0"/>
+          <a:chOff x="0" y="0"/>
+          <a:chExt cx="0" cy="0"/>
+        </a:xfrm>
+      </p:grpSpPr>
+      <p:sp>
+        <p:nvSpPr>
+          <p:cNvPr id="2" name="Slide Image Placeholder 1"/>
+          <p:cNvSpPr>
+            <a:spLocks noGrp="1" noRot="1" noChangeAspect="1"/>
+          </p:cNvSpPr>
+          <p:nvPr>
+            <p:ph type="sldImg"/>
+          </p:nvPr>
+        </p:nvSpPr>
+        <p:spPr/>
+      </p:sp>
+      <p:sp>
+        <p:nvSpPr>
+          <p:cNvPr id="3" name="Notes Placeholder 2"/>
+          <p:cNvSpPr>
+            <a:spLocks noGrp="1"/>
+          </p:cNvSpPr>
+          <p:nvPr>
+            <p:ph type="body" idx="1"/>
+          </p:nvPr>
+        </p:nvSpPr>
+        <p:spPr/>
+        <p:txBody>
+          <a:bodyPr/>
+          <a:lstStyle/>
+          <a:p>
+            <a:pPr marL="171450" indent="-171450">
+              <a:buFont typeface="Arial" panose="020B0604020202020204" pitchFamily="34" charset="0"/>
+              <a:buChar char="•"/>
+            </a:pPr>
+            <a:endParaRPr lang="en-IN" dirty="0"/>
+          </a:p>
+        </p:txBody>
+      </p:sp>
+      <p:sp>
+        <p:nvSpPr>
+          <p:cNvPr id="4" name="Slide Number Placeholder 3"/>
+          <p:cNvSpPr>
+            <a:spLocks noGrp="1"/>
+          </p:cNvSpPr>
+          <p:nvPr>
+            <p:ph type="sldNum" sz="quarter" idx="5"/>
+          </p:nvPr>
+        </p:nvSpPr>
+        <p:spPr/>
+        <p:txBody>
+          <a:bodyPr/>
+          <a:lstStyle/>
+          <a:p>
+            <a:fld id="{9705557C-6348-43CC-A73A-4CBAAF49F69E}" type="slidenum">
+              <a:rPr lang="en-IN" smtClean="0"/>
+              <a:t>7</a:t>
+            </a:fld>
+            <a:endParaRPr lang="en-IN"/>
+          </a:p>
+        </p:txBody>
+      </p:sp>
+    </p:spTree>
+    <p:extLst>
+      <p:ext uri="{BB962C8B-B14F-4D97-AF65-F5344CB8AC3E}">
+        <p14:creationId xmlns:p14="http://schemas.microsoft.com/office/powerpoint/2010/main" val="2327418244"/>
+      </p:ext>
+    </p:extLst>
+  </p:cSld>
+  <p:clrMapOvr>
+    <a:masterClrMapping/>
+  </p:clrMapOvr>
+</p:notes>
+</file>
+
+<file path=ppt/notesSlides/notesSlide2.xml><?xml version="1.0" encoding="utf-8"?>
+<p:notes xmlns:a="http://schemas.openxmlformats.org/drawingml/2006/main" xmlns:r="http://schemas.openxmlformats.org/officeDocument/2006/relationships" xmlns:p="http://schemas.openxmlformats.org/presentationml/2006/main">
+  <p:cSld>
+    <p:spTree>
+      <p:nvGrpSpPr>
+        <p:cNvPr id="1" name=""/>
+        <p:cNvGrpSpPr/>
+        <p:nvPr/>
+      </p:nvGrpSpPr>
+      <p:grpSpPr>
+        <a:xfrm>
+          <a:off x="0" y="0"/>
+          <a:ext cx="0" cy="0"/>
+          <a:chOff x="0" y="0"/>
+          <a:chExt cx="0" cy="0"/>
+        </a:xfrm>
+      </p:grpSpPr>
+      <p:sp>
+        <p:nvSpPr>
+          <p:cNvPr id="2" name="Slide Image Placeholder 1"/>
+          <p:cNvSpPr>
+            <a:spLocks noGrp="1" noRot="1" noChangeAspect="1"/>
+          </p:cNvSpPr>
+          <p:nvPr>
+            <p:ph type="sldImg"/>
+          </p:nvPr>
+        </p:nvSpPr>
+        <p:spPr/>
+      </p:sp>
+      <p:sp>
+        <p:nvSpPr>
+          <p:cNvPr id="3" name="Notes Placeholder 2"/>
+          <p:cNvSpPr>
+            <a:spLocks noGrp="1"/>
+          </p:cNvSpPr>
+          <p:nvPr>
+            <p:ph type="body" idx="1"/>
+          </p:nvPr>
+        </p:nvSpPr>
+        <p:spPr/>
+        <p:txBody>
+          <a:bodyPr/>
+          <a:lstStyle/>
+          <a:p>
+            <a:endParaRPr lang="en-IN" dirty="0"/>
+          </a:p>
+        </p:txBody>
+      </p:sp>
+      <p:sp>
+        <p:nvSpPr>
+          <p:cNvPr id="4" name="Slide Number Placeholder 3"/>
+          <p:cNvSpPr>
+            <a:spLocks noGrp="1"/>
+          </p:cNvSpPr>
+          <p:nvPr>
+            <p:ph type="sldNum" sz="quarter" idx="5"/>
+          </p:nvPr>
+        </p:nvSpPr>
+        <p:spPr/>
+        <p:txBody>
+          <a:bodyPr/>
+          <a:lstStyle/>
+          <a:p>
+            <a:fld id="{9705557C-6348-43CC-A73A-4CBAAF49F69E}" type="slidenum">
+              <a:rPr lang="en-IN" smtClean="0"/>
+              <a:t>8</a:t>
+            </a:fld>
+            <a:endParaRPr lang="en-IN"/>
+          </a:p>
+        </p:txBody>
+      </p:sp>
+    </p:spTree>
+    <p:extLst>
+      <p:ext uri="{BB962C8B-B14F-4D97-AF65-F5344CB8AC3E}">
+        <p14:creationId xmlns:p14="http://schemas.microsoft.com/office/powerpoint/2010/main" val="1366110030"/>
+      </p:ext>
+    </p:extLst>
+  </p:cSld>
+  <p:clrMapOvr>
+    <a:masterClrMapping/>
+  </p:clrMapOvr>
+</p:notes>
 </file>
 
 <file path=ppt/slideLayouts/slideLayout1.xml><?xml version="1.0" encoding="utf-8"?>
@@ -1955,7 +2143,7 @@
             <a:fld id="{48A87A34-81AB-432B-8DAE-1953F412C126}" type="datetimeFigureOut">
               <a:rPr lang="en-US" smtClean="0"/>
               <a:pPr/>
-              <a:t>8/30/2025</a:t>
+              <a:t>9/3/2025</a:t>
             </a:fld>
             <a:endParaRPr lang="en-US" dirty="0"/>
           </a:p>
@@ -3485,7 +3673,7 @@
           <a:p>
             <a:fld id="{48A87A34-81AB-432B-8DAE-1953F412C126}" type="datetimeFigureOut">
               <a:rPr lang="en-US" smtClean="0"/>
-              <a:t>8/30/2025</a:t>
+              <a:t>9/3/2025</a:t>
             </a:fld>
             <a:endParaRPr lang="en-US" dirty="0"/>
           </a:p>
@@ -5021,7 +5209,7 @@
           <a:p>
             <a:fld id="{48A87A34-81AB-432B-8DAE-1953F412C126}" type="datetimeFigureOut">
               <a:rPr lang="en-US" smtClean="0"/>
-              <a:t>8/30/2025</a:t>
+              <a:t>9/3/2025</a:t>
             </a:fld>
             <a:endParaRPr lang="en-US" dirty="0"/>
           </a:p>
@@ -6476,7 +6664,7 @@
           <a:p>
             <a:fld id="{48A87A34-81AB-432B-8DAE-1953F412C126}" type="datetimeFigureOut">
               <a:rPr lang="en-US" smtClean="0"/>
-              <a:t>8/30/2025</a:t>
+              <a:t>9/3/2025</a:t>
             </a:fld>
             <a:endParaRPr lang="en-US" dirty="0"/>
           </a:p>
@@ -7929,7 +8117,7 @@
           <a:p>
             <a:fld id="{48A87A34-81AB-432B-8DAE-1953F412C126}" type="datetimeFigureOut">
               <a:rPr lang="en-US" smtClean="0"/>
-              <a:t>8/30/2025</a:t>
+              <a:t>9/3/2025</a:t>
             </a:fld>
             <a:endParaRPr lang="en-US" dirty="0"/>
           </a:p>
@@ -9384,7 +9572,7 @@
           <a:p>
             <a:fld id="{48A87A34-81AB-432B-8DAE-1953F412C126}" type="datetimeFigureOut">
               <a:rPr lang="en-US" smtClean="0"/>
-              <a:t>8/30/2025</a:t>
+              <a:t>9/3/2025</a:t>
             </a:fld>
             <a:endParaRPr lang="en-US" dirty="0"/>
           </a:p>
@@ -10859,7 +11047,7 @@
           <a:p>
             <a:fld id="{48A87A34-81AB-432B-8DAE-1953F412C126}" type="datetimeFigureOut">
               <a:rPr lang="en-US" smtClean="0"/>
-              <a:t>8/30/2025</a:t>
+              <a:t>9/3/2025</a:t>
             </a:fld>
             <a:endParaRPr lang="en-US" dirty="0"/>
           </a:p>
@@ -12334,7 +12522,7 @@
           <a:p>
             <a:fld id="{48A87A34-81AB-432B-8DAE-1953F412C126}" type="datetimeFigureOut">
               <a:rPr lang="en-US" smtClean="0"/>
-              <a:t>8/30/2025</a:t>
+              <a:t>9/3/2025</a:t>
             </a:fld>
             <a:endParaRPr lang="en-US" dirty="0"/>
           </a:p>
@@ -13842,7 +14030,7 @@
           <a:p>
             <a:fld id="{48A87A34-81AB-432B-8DAE-1953F412C126}" type="datetimeFigureOut">
               <a:rPr lang="en-US" smtClean="0"/>
-              <a:t>8/30/2025</a:t>
+              <a:t>9/3/2025</a:t>
             </a:fld>
             <a:endParaRPr lang="en-US" dirty="0"/>
           </a:p>
@@ -15363,7 +15551,7 @@
           <a:p>
             <a:fld id="{48A87A34-81AB-432B-8DAE-1953F412C126}" type="datetimeFigureOut">
               <a:rPr lang="en-US" smtClean="0"/>
-              <a:t>8/30/2025</a:t>
+              <a:t>9/3/2025</a:t>
             </a:fld>
             <a:endParaRPr lang="en-US" dirty="0"/>
           </a:p>
@@ -17028,7 +17216,7 @@
           <a:p>
             <a:fld id="{48A87A34-81AB-432B-8DAE-1953F412C126}" type="datetimeFigureOut">
               <a:rPr lang="en-US" smtClean="0"/>
-              <a:t>8/30/2025</a:t>
+              <a:t>9/3/2025</a:t>
             </a:fld>
             <a:endParaRPr lang="en-US" dirty="0"/>
           </a:p>
@@ -18426,7 +18614,7 @@
           <a:p>
             <a:fld id="{48A87A34-81AB-432B-8DAE-1953F412C126}" type="datetimeFigureOut">
               <a:rPr lang="en-US" smtClean="0"/>
-              <a:t>8/30/2025</a:t>
+              <a:t>9/3/2025</a:t>
             </a:fld>
             <a:endParaRPr lang="en-US" dirty="0"/>
           </a:p>
@@ -18526,7 +18714,7 @@
           <a:p>
             <a:fld id="{48A87A34-81AB-432B-8DAE-1953F412C126}" type="datetimeFigureOut">
               <a:rPr lang="en-US" smtClean="0"/>
-              <a:t>8/30/2025</a:t>
+              <a:t>9/3/2025</a:t>
             </a:fld>
             <a:endParaRPr lang="en-US" dirty="0"/>
           </a:p>
@@ -18750,7 +18938,7 @@
             <a:fld id="{48A87A34-81AB-432B-8DAE-1953F412C126}" type="datetimeFigureOut">
               <a:rPr lang="en-US" smtClean="0"/>
               <a:pPr/>
-              <a:t>8/30/2025</a:t>
+              <a:t>9/3/2025</a:t>
             </a:fld>
             <a:endParaRPr lang="en-US" dirty="0"/>
           </a:p>
@@ -20211,10 +20399,10 @@
       </p:grpSpPr>
       <p:sp>
         <p:nvSpPr>
-          <p:cNvPr id="4" name="Title 3">
+          <p:cNvPr id="2" name="Title 1">
             <a:extLst>
               <a:ext uri="{FF2B5EF4-FFF2-40B4-BE49-F238E27FC236}">
-                <a16:creationId xmlns:a16="http://schemas.microsoft.com/office/drawing/2014/main" id="{C1909BB4-5187-B06F-B493-9586FAD68DC6}"/>
+                <a16:creationId xmlns:a16="http://schemas.microsoft.com/office/drawing/2014/main" id="{1ECAD9DE-7B28-46B6-9CDB-A8CC82E8EDDD}"/>
               </a:ext>
             </a:extLst>
           </p:cNvPr>
@@ -20232,7 +20420,14 @@
           <a:p>
             <a:r>
               <a:rPr lang="en-US" dirty="0"/>
-              <a:t>References</a:t>
+              <a:t>sim/scripts/run</a:t>
+            </a:r>
+            <a:br>
+              <a:rPr lang="en-US" dirty="0"/>
+            </a:br>
+            <a:r>
+              <a:rPr lang="en-US" dirty="0"/>
+              <a:t>run_sim.py</a:t>
             </a:r>
             <a:endParaRPr lang="en-IN" dirty="0"/>
           </a:p>
@@ -20240,10 +20435,10 @@
       </p:sp>
       <p:sp>
         <p:nvSpPr>
-          <p:cNvPr id="5" name="Content Placeholder 4">
+          <p:cNvPr id="3" name="Content Placeholder 2">
             <a:extLst>
               <a:ext uri="{FF2B5EF4-FFF2-40B4-BE49-F238E27FC236}">
-                <a16:creationId xmlns:a16="http://schemas.microsoft.com/office/drawing/2014/main" id="{70F7BD49-804D-739A-58E3-141DB9312BC1}"/>
+                <a16:creationId xmlns:a16="http://schemas.microsoft.com/office/drawing/2014/main" id="{71F06692-38CD-FD23-5E69-A0402A835775}"/>
               </a:ext>
             </a:extLst>
           </p:cNvPr>
@@ -20260,6 +20455,708 @@
           <a:lstStyle/>
           <a:p>
             <a:r>
+              <a:rPr lang="en-US" dirty="0"/>
+              <a:t>Primary arguments :</a:t>
+            </a:r>
+          </a:p>
+          <a:p>
+            <a:pPr lvl="1"/>
+            <a:r>
+              <a:rPr lang="en-IN" dirty="0"/>
+              <a:t>-code  </a:t>
+            </a:r>
+            <a:r>
+              <a:rPr lang="en-IN" dirty="0">
+                <a:sym typeface="Wingdings" panose="05000000000000000000" pitchFamily="2" charset="2"/>
+              </a:rPr>
+              <a:t> C file which is compiled for a run</a:t>
+            </a:r>
+          </a:p>
+          <a:p>
+            <a:pPr lvl="1"/>
+            <a:r>
+              <a:rPr lang="en-IN" dirty="0">
+                <a:sym typeface="Wingdings" panose="05000000000000000000" pitchFamily="2" charset="2"/>
+              </a:rPr>
+              <a:t>-tb  path to testbench directory for a run</a:t>
+            </a:r>
+          </a:p>
+          <a:p>
+            <a:r>
+              <a:rPr lang="en-IN" dirty="0">
+                <a:sym typeface="Wingdings" panose="05000000000000000000" pitchFamily="2" charset="2"/>
+              </a:rPr>
+              <a:t>Flow :</a:t>
+            </a:r>
+          </a:p>
+          <a:p>
+            <a:pPr marL="800100" lvl="1" indent="-342900">
+              <a:buFont typeface="+mj-lt"/>
+              <a:buAutoNum type="arabicPeriod"/>
+            </a:pPr>
+            <a:r>
+              <a:rPr lang="en-IN" dirty="0">
+                <a:sym typeface="Wingdings" panose="05000000000000000000" pitchFamily="2" charset="2"/>
+              </a:rPr>
+              <a:t>Create run directory – sim/runs/&lt;</a:t>
+            </a:r>
+            <a:r>
+              <a:rPr lang="en-IN" dirty="0" err="1">
+                <a:sym typeface="Wingdings" panose="05000000000000000000" pitchFamily="2" charset="2"/>
+              </a:rPr>
+              <a:t>c_filename</a:t>
+            </a:r>
+            <a:r>
+              <a:rPr lang="en-IN" dirty="0">
+                <a:sym typeface="Wingdings" panose="05000000000000000000" pitchFamily="2" charset="2"/>
+              </a:rPr>
+              <a:t>&gt;_on_&lt;</a:t>
+            </a:r>
+            <a:r>
+              <a:rPr lang="en-IN" dirty="0" err="1">
+                <a:sym typeface="Wingdings" panose="05000000000000000000" pitchFamily="2" charset="2"/>
+              </a:rPr>
+              <a:t>tb_dir_name</a:t>
+            </a:r>
+            <a:r>
+              <a:rPr lang="en-IN" dirty="0">
+                <a:sym typeface="Wingdings" panose="05000000000000000000" pitchFamily="2" charset="2"/>
+              </a:rPr>
+              <a:t>&gt;</a:t>
+            </a:r>
+          </a:p>
+          <a:p>
+            <a:pPr marL="800100" lvl="1" indent="-342900">
+              <a:buFont typeface="+mj-lt"/>
+              <a:buAutoNum type="arabicPeriod"/>
+            </a:pPr>
+            <a:r>
+              <a:rPr lang="en-IN" dirty="0">
+                <a:sym typeface="Wingdings" panose="05000000000000000000" pitchFamily="2" charset="2"/>
+              </a:rPr>
+              <a:t>Compile C code (</a:t>
+            </a:r>
+            <a:r>
+              <a:rPr lang="en-IN" dirty="0" err="1"/>
+              <a:t>riscv</a:t>
+            </a:r>
+            <a:r>
+              <a:rPr lang="en-IN" dirty="0"/>
+              <a:t>-none-elf-</a:t>
+            </a:r>
+            <a:r>
+              <a:rPr lang="en-IN" dirty="0" err="1"/>
+              <a:t>gcc</a:t>
+            </a:r>
+            <a:r>
+              <a:rPr lang="en-IN" dirty="0">
+                <a:sym typeface="Wingdings" panose="05000000000000000000" pitchFamily="2" charset="2"/>
+              </a:rPr>
+              <a:t>) and build hex files</a:t>
+            </a:r>
+          </a:p>
+          <a:p>
+            <a:pPr lvl="2"/>
+            <a:r>
+              <a:rPr lang="en-IN" dirty="0">
+                <a:sym typeface="Wingdings" panose="05000000000000000000" pitchFamily="2" charset="2"/>
+              </a:rPr>
+              <a:t>ELFs, .bin, .</a:t>
+            </a:r>
+            <a:r>
+              <a:rPr lang="en-IN" dirty="0" err="1">
+                <a:sym typeface="Wingdings" panose="05000000000000000000" pitchFamily="2" charset="2"/>
+              </a:rPr>
+              <a:t>disasm</a:t>
+            </a:r>
+            <a:r>
+              <a:rPr lang="en-IN" dirty="0">
+                <a:sym typeface="Wingdings" panose="05000000000000000000" pitchFamily="2" charset="2"/>
+              </a:rPr>
+              <a:t>, .s and .hex files generated in sim/images/&lt;</a:t>
+            </a:r>
+            <a:r>
+              <a:rPr lang="en-IN" dirty="0" err="1">
+                <a:sym typeface="Wingdings" panose="05000000000000000000" pitchFamily="2" charset="2"/>
+              </a:rPr>
+              <a:t>c_filename</a:t>
+            </a:r>
+            <a:r>
+              <a:rPr lang="en-IN" dirty="0">
+                <a:sym typeface="Wingdings" panose="05000000000000000000" pitchFamily="2" charset="2"/>
+              </a:rPr>
+              <a:t>&gt;</a:t>
+            </a:r>
+          </a:p>
+          <a:p>
+            <a:pPr marL="800100" lvl="1" indent="-342900">
+              <a:buFont typeface="+mj-lt"/>
+              <a:buAutoNum type="arabicPeriod"/>
+            </a:pPr>
+            <a:r>
+              <a:rPr lang="en-IN" dirty="0">
+                <a:sym typeface="Wingdings" panose="05000000000000000000" pitchFamily="2" charset="2"/>
+              </a:rPr>
+              <a:t>Copy hex files into run directory</a:t>
+            </a:r>
+          </a:p>
+          <a:p>
+            <a:pPr marL="800100" lvl="1" indent="-342900">
+              <a:buFont typeface="+mj-lt"/>
+              <a:buAutoNum type="arabicPeriod"/>
+            </a:pPr>
+            <a:r>
+              <a:rPr lang="en-IN" dirty="0">
+                <a:sym typeface="Wingdings" panose="05000000000000000000" pitchFamily="2" charset="2"/>
+              </a:rPr>
+              <a:t>Run </a:t>
+            </a:r>
+            <a:r>
+              <a:rPr lang="en-IN" dirty="0" err="1">
+                <a:sym typeface="Wingdings" panose="05000000000000000000" pitchFamily="2" charset="2"/>
+              </a:rPr>
+              <a:t>verilator</a:t>
+            </a:r>
+            <a:r>
+              <a:rPr lang="en-IN" dirty="0">
+                <a:sym typeface="Wingdings" panose="05000000000000000000" pitchFamily="2" charset="2"/>
+              </a:rPr>
+              <a:t> command</a:t>
+            </a:r>
+          </a:p>
+          <a:p>
+            <a:pPr lvl="2"/>
+            <a:r>
+              <a:rPr lang="en-IN" dirty="0">
+                <a:sym typeface="Wingdings" panose="05000000000000000000" pitchFamily="2" charset="2"/>
+              </a:rPr>
+              <a:t>Build files generated in sim/build/&lt;</a:t>
+            </a:r>
+            <a:r>
+              <a:rPr lang="en-IN" dirty="0" err="1">
+                <a:sym typeface="Wingdings" panose="05000000000000000000" pitchFamily="2" charset="2"/>
+              </a:rPr>
+              <a:t>c_filename</a:t>
+            </a:r>
+            <a:r>
+              <a:rPr lang="en-IN" dirty="0">
+                <a:sym typeface="Wingdings" panose="05000000000000000000" pitchFamily="2" charset="2"/>
+              </a:rPr>
+              <a:t>&gt;_on_&lt;</a:t>
+            </a:r>
+            <a:r>
+              <a:rPr lang="en-IN" dirty="0" err="1">
+                <a:sym typeface="Wingdings" panose="05000000000000000000" pitchFamily="2" charset="2"/>
+              </a:rPr>
+              <a:t>tb_dir_name</a:t>
+            </a:r>
+            <a:r>
+              <a:rPr lang="en-IN" dirty="0">
+                <a:sym typeface="Wingdings" panose="05000000000000000000" pitchFamily="2" charset="2"/>
+              </a:rPr>
+              <a:t>&gt;</a:t>
+            </a:r>
+          </a:p>
+          <a:p>
+            <a:pPr marL="800100" lvl="1" indent="-342900">
+              <a:buFont typeface="+mj-lt"/>
+              <a:buAutoNum type="arabicPeriod"/>
+            </a:pPr>
+            <a:r>
+              <a:rPr lang="en-IN" dirty="0">
+                <a:sym typeface="Wingdings" panose="05000000000000000000" pitchFamily="2" charset="2"/>
+              </a:rPr>
+              <a:t>Build </a:t>
+            </a:r>
+            <a:r>
+              <a:rPr lang="en-IN" dirty="0" err="1">
+                <a:sym typeface="Wingdings" panose="05000000000000000000" pitchFamily="2" charset="2"/>
+              </a:rPr>
+              <a:t>verilated</a:t>
+            </a:r>
+            <a:r>
+              <a:rPr lang="en-IN" dirty="0">
+                <a:sym typeface="Wingdings" panose="05000000000000000000" pitchFamily="2" charset="2"/>
+              </a:rPr>
+              <a:t> make</a:t>
+            </a:r>
+          </a:p>
+          <a:p>
+            <a:pPr marL="800100" lvl="1" indent="-342900">
+              <a:buFont typeface="+mj-lt"/>
+              <a:buAutoNum type="arabicPeriod"/>
+            </a:pPr>
+            <a:r>
+              <a:rPr lang="en-IN" dirty="0">
+                <a:sym typeface="Wingdings" panose="05000000000000000000" pitchFamily="2" charset="2"/>
+              </a:rPr>
+              <a:t>Run simulation (sim/build/V&lt;</a:t>
+            </a:r>
+            <a:r>
+              <a:rPr lang="en-IN" dirty="0" err="1">
+                <a:sym typeface="Wingdings" panose="05000000000000000000" pitchFamily="2" charset="2"/>
+              </a:rPr>
+              <a:t>tb_filename</a:t>
+            </a:r>
+            <a:r>
+              <a:rPr lang="en-IN" dirty="0">
+                <a:sym typeface="Wingdings" panose="05000000000000000000" pitchFamily="2" charset="2"/>
+              </a:rPr>
+              <a:t>&gt;.exe)</a:t>
+            </a:r>
+            <a:endParaRPr lang="en-IN" dirty="0"/>
+          </a:p>
+        </p:txBody>
+      </p:sp>
+    </p:spTree>
+    <p:extLst>
+      <p:ext uri="{BB962C8B-B14F-4D97-AF65-F5344CB8AC3E}">
+        <p14:creationId xmlns:p14="http://schemas.microsoft.com/office/powerpoint/2010/main" val="2158570234"/>
+      </p:ext>
+    </p:extLst>
+  </p:cSld>
+  <p:clrMapOvr>
+    <a:masterClrMapping/>
+  </p:clrMapOvr>
+</p:sld>
+</file>
+
+<file path=ppt/slides/slide7.xml><?xml version="1.0" encoding="utf-8"?>
+<p:sld xmlns:a="http://schemas.openxmlformats.org/drawingml/2006/main" xmlns:r="http://schemas.openxmlformats.org/officeDocument/2006/relationships" xmlns:p="http://schemas.openxmlformats.org/presentationml/2006/main">
+  <p:cSld>
+    <p:spTree>
+      <p:nvGrpSpPr>
+        <p:cNvPr id="1" name="">
+          <a:extLst>
+            <a:ext uri="{FF2B5EF4-FFF2-40B4-BE49-F238E27FC236}">
+              <a16:creationId xmlns:a16="http://schemas.microsoft.com/office/drawing/2014/main" id="{916A7CAC-2A21-2661-3F24-FBB154895562}"/>
+            </a:ext>
+          </a:extLst>
+        </p:cNvPr>
+        <p:cNvGrpSpPr/>
+        <p:nvPr/>
+      </p:nvGrpSpPr>
+      <p:grpSpPr>
+        <a:xfrm>
+          <a:off x="0" y="0"/>
+          <a:ext cx="0" cy="0"/>
+          <a:chOff x="0" y="0"/>
+          <a:chExt cx="0" cy="0"/>
+        </a:xfrm>
+      </p:grpSpPr>
+      <p:sp>
+        <p:nvSpPr>
+          <p:cNvPr id="2" name="Title 1">
+            <a:extLst>
+              <a:ext uri="{FF2B5EF4-FFF2-40B4-BE49-F238E27FC236}">
+                <a16:creationId xmlns:a16="http://schemas.microsoft.com/office/drawing/2014/main" id="{DD1CAF22-1917-2BF2-4E35-F428B8DB2F55}"/>
+              </a:ext>
+            </a:extLst>
+          </p:cNvPr>
+          <p:cNvSpPr>
+            <a:spLocks noGrp="1"/>
+          </p:cNvSpPr>
+          <p:nvPr>
+            <p:ph type="title"/>
+          </p:nvPr>
+        </p:nvSpPr>
+        <p:spPr/>
+        <p:txBody>
+          <a:bodyPr/>
+          <a:lstStyle/>
+          <a:p>
+            <a:r>
+              <a:rPr lang="en-US" dirty="0"/>
+              <a:t>sim/scripts/run</a:t>
+            </a:r>
+            <a:br>
+              <a:rPr lang="en-US" dirty="0"/>
+            </a:br>
+            <a:r>
+              <a:rPr lang="en-US" dirty="0"/>
+              <a:t>run_sim.py</a:t>
+            </a:r>
+            <a:endParaRPr lang="en-IN" dirty="0"/>
+          </a:p>
+        </p:txBody>
+      </p:sp>
+      <p:sp>
+        <p:nvSpPr>
+          <p:cNvPr id="3" name="Content Placeholder 2">
+            <a:extLst>
+              <a:ext uri="{FF2B5EF4-FFF2-40B4-BE49-F238E27FC236}">
+                <a16:creationId xmlns:a16="http://schemas.microsoft.com/office/drawing/2014/main" id="{9E5E3660-B1B0-863C-4590-7FA0B91F7D8C}"/>
+              </a:ext>
+            </a:extLst>
+          </p:cNvPr>
+          <p:cNvSpPr>
+            <a:spLocks noGrp="1"/>
+          </p:cNvSpPr>
+          <p:nvPr>
+            <p:ph idx="1"/>
+          </p:nvPr>
+        </p:nvSpPr>
+        <p:spPr/>
+        <p:txBody>
+          <a:bodyPr/>
+          <a:lstStyle/>
+          <a:p>
+            <a:r>
+              <a:rPr lang="en-US" dirty="0"/>
+              <a:t>Notes</a:t>
+            </a:r>
+          </a:p>
+          <a:p>
+            <a:pPr marL="800100" lvl="1" indent="-342900">
+              <a:buFont typeface="+mj-lt"/>
+              <a:buAutoNum type="arabicPeriod"/>
+            </a:pPr>
+            <a:r>
+              <a:rPr lang="en-US" dirty="0"/>
+              <a:t>(Currently) </a:t>
+            </a:r>
+            <a:r>
+              <a:rPr lang="en-US" dirty="0" err="1"/>
+              <a:t>imem.hex</a:t>
+            </a:r>
+            <a:r>
+              <a:rPr lang="en-US" dirty="0"/>
+              <a:t> and </a:t>
+            </a:r>
+            <a:r>
+              <a:rPr lang="en-US" dirty="0" err="1"/>
+              <a:t>dmem.hex</a:t>
+            </a:r>
+            <a:r>
+              <a:rPr lang="en-US" dirty="0"/>
+              <a:t> are generated separately during the C build phase.</a:t>
+            </a:r>
+          </a:p>
+          <a:p>
+            <a:pPr marL="800100" lvl="1" indent="-342900">
+              <a:buFont typeface="+mj-lt"/>
+              <a:buAutoNum type="arabicPeriod"/>
+            </a:pPr>
+            <a:r>
+              <a:rPr lang="en-US" dirty="0"/>
+              <a:t>&lt;</a:t>
+            </a:r>
+            <a:r>
+              <a:rPr lang="en-US" dirty="0" err="1"/>
+              <a:t>tb_dir_path</a:t>
+            </a:r>
+            <a:r>
+              <a:rPr lang="en-US" dirty="0"/>
+              <a:t>&gt;/</a:t>
+            </a:r>
+            <a:r>
+              <a:rPr lang="en-US" dirty="0" err="1"/>
+              <a:t>startup.s</a:t>
+            </a:r>
+            <a:r>
+              <a:rPr lang="en-US" dirty="0"/>
+              <a:t> was needed to ensure PC jumps to main() after it starts (from 0x00).</a:t>
+            </a:r>
+          </a:p>
+          <a:p>
+            <a:pPr marL="800100" lvl="1" indent="-342900">
+              <a:buFont typeface="+mj-lt"/>
+              <a:buAutoNum type="arabicPeriod"/>
+            </a:pPr>
+            <a:r>
+              <a:rPr lang="en-US" dirty="0"/>
+              <a:t>Arguments –CFLAGS and –LDFLAGS in the </a:t>
+            </a:r>
+            <a:r>
+              <a:rPr lang="en-US" dirty="0" err="1"/>
+              <a:t>verilator</a:t>
+            </a:r>
+            <a:r>
+              <a:rPr lang="en-US" dirty="0"/>
+              <a:t> command are a workaround since it wasn’t able to find </a:t>
+            </a:r>
+            <a:r>
+              <a:rPr lang="en-US" dirty="0" err="1"/>
+              <a:t>zlib.h</a:t>
+            </a:r>
+            <a:r>
+              <a:rPr lang="en-US" dirty="0"/>
+              <a:t>. (Also, </a:t>
+            </a:r>
+            <a:r>
+              <a:rPr lang="en-IN" dirty="0"/>
+              <a:t>-DWIN32 -D_WIN32 -D__MINGW64__).</a:t>
+            </a:r>
+          </a:p>
+          <a:p>
+            <a:pPr marL="800100" lvl="1" indent="-342900">
+              <a:buFont typeface="+mj-lt"/>
+              <a:buAutoNum type="arabicPeriod"/>
+            </a:pPr>
+            <a:r>
+              <a:rPr lang="en-US" dirty="0"/>
+              <a:t>Environment variable VERILATOR_ROOT is being set before running the make command.</a:t>
+            </a:r>
+          </a:p>
+          <a:p>
+            <a:pPr marL="800100" lvl="1" indent="-342900">
+              <a:buFont typeface="+mj-lt"/>
+              <a:buAutoNum type="arabicPeriod"/>
+            </a:pPr>
+            <a:r>
+              <a:rPr lang="en-US" dirty="0"/>
+              <a:t>Also, MINGW64 bin path is given priority over Cygwin GCC as the make command confuses the two otherwise.</a:t>
+            </a:r>
+          </a:p>
+          <a:p>
+            <a:pPr marL="800100" lvl="1" indent="-342900">
+              <a:buFont typeface="+mj-lt"/>
+              <a:buAutoNum type="arabicPeriod"/>
+            </a:pPr>
+            <a:r>
+              <a:rPr lang="en-IN" dirty="0" err="1"/>
+              <a:t>sys.stdout.flush</a:t>
+            </a:r>
+            <a:r>
+              <a:rPr lang="en-IN" dirty="0"/>
+              <a:t>() is just to flush the terminal output, otherwise line breaks might not be processed correctly during and after the make step.</a:t>
+            </a:r>
+          </a:p>
+        </p:txBody>
+      </p:sp>
+    </p:spTree>
+    <p:extLst>
+      <p:ext uri="{BB962C8B-B14F-4D97-AF65-F5344CB8AC3E}">
+        <p14:creationId xmlns:p14="http://schemas.microsoft.com/office/powerpoint/2010/main" val="2974123424"/>
+      </p:ext>
+    </p:extLst>
+  </p:cSld>
+  <p:clrMapOvr>
+    <a:masterClrMapping/>
+  </p:clrMapOvr>
+</p:sld>
+</file>
+
+<file path=ppt/slides/slide8.xml><?xml version="1.0" encoding="utf-8"?>
+<p:sld xmlns:a="http://schemas.openxmlformats.org/drawingml/2006/main" xmlns:r="http://schemas.openxmlformats.org/officeDocument/2006/relationships" xmlns:p="http://schemas.openxmlformats.org/presentationml/2006/main">
+  <p:cSld>
+    <p:spTree>
+      <p:nvGrpSpPr>
+        <p:cNvPr id="1" name=""/>
+        <p:cNvGrpSpPr/>
+        <p:nvPr/>
+      </p:nvGrpSpPr>
+      <p:grpSpPr>
+        <a:xfrm>
+          <a:off x="0" y="0"/>
+          <a:ext cx="0" cy="0"/>
+          <a:chOff x="0" y="0"/>
+          <a:chExt cx="0" cy="0"/>
+        </a:xfrm>
+      </p:grpSpPr>
+      <p:sp>
+        <p:nvSpPr>
+          <p:cNvPr id="4" name="Title 3">
+            <a:extLst>
+              <a:ext uri="{FF2B5EF4-FFF2-40B4-BE49-F238E27FC236}">
+                <a16:creationId xmlns:a16="http://schemas.microsoft.com/office/drawing/2014/main" id="{CBDFBB19-9E5B-A3F1-6C30-618BEBD0074C}"/>
+              </a:ext>
+            </a:extLst>
+          </p:cNvPr>
+          <p:cNvSpPr>
+            <a:spLocks noGrp="1"/>
+          </p:cNvSpPr>
+          <p:nvPr>
+            <p:ph type="title"/>
+          </p:nvPr>
+        </p:nvSpPr>
+        <p:spPr/>
+        <p:txBody>
+          <a:bodyPr/>
+          <a:lstStyle/>
+          <a:p>
+            <a:r>
+              <a:rPr lang="en-US" dirty="0"/>
+              <a:t>TBD</a:t>
+            </a:r>
+            <a:endParaRPr lang="en-IN" dirty="0"/>
+          </a:p>
+        </p:txBody>
+      </p:sp>
+      <p:sp>
+        <p:nvSpPr>
+          <p:cNvPr id="5" name="Content Placeholder 4">
+            <a:extLst>
+              <a:ext uri="{FF2B5EF4-FFF2-40B4-BE49-F238E27FC236}">
+                <a16:creationId xmlns:a16="http://schemas.microsoft.com/office/drawing/2014/main" id="{1A5A8427-A94F-8387-AA02-5D06EEAC6365}"/>
+              </a:ext>
+            </a:extLst>
+          </p:cNvPr>
+          <p:cNvSpPr>
+            <a:spLocks noGrp="1"/>
+          </p:cNvSpPr>
+          <p:nvPr>
+            <p:ph idx="1"/>
+          </p:nvPr>
+        </p:nvSpPr>
+        <p:spPr/>
+        <p:txBody>
+          <a:bodyPr/>
+          <a:lstStyle/>
+          <a:p>
+            <a:pPr marL="342900" indent="-342900">
+              <a:buFont typeface="+mj-lt"/>
+              <a:buAutoNum type="arabicPeriod"/>
+            </a:pPr>
+            <a:r>
+              <a:rPr lang="en-IN" dirty="0"/>
+              <a:t>Environment</a:t>
+            </a:r>
+          </a:p>
+          <a:p>
+            <a:pPr lvl="1"/>
+            <a:r>
+              <a:rPr lang="en-IN" dirty="0"/>
+              <a:t>Add testbench infra / classes that run checks on code</a:t>
+            </a:r>
+          </a:p>
+          <a:p>
+            <a:pPr lvl="1"/>
+            <a:r>
+              <a:rPr lang="en-IN" dirty="0"/>
+              <a:t>Add testbench infra / classes that track execution performance</a:t>
+            </a:r>
+            <a:endParaRPr lang="en-US" dirty="0"/>
+          </a:p>
+          <a:p>
+            <a:pPr marL="342900" indent="-342900">
+              <a:buFont typeface="+mj-lt"/>
+              <a:buAutoNum type="arabicPeriod"/>
+            </a:pPr>
+            <a:r>
+              <a:rPr lang="en-US" dirty="0"/>
+              <a:t>Implementation</a:t>
+            </a:r>
+          </a:p>
+          <a:p>
+            <a:pPr lvl="1"/>
+            <a:r>
+              <a:rPr lang="en-US" dirty="0"/>
+              <a:t>Exceptions, Traps and Interrupts</a:t>
+            </a:r>
+          </a:p>
+          <a:p>
+            <a:pPr lvl="1"/>
+            <a:r>
+              <a:rPr lang="en-US" dirty="0"/>
+              <a:t>Single Cycle Core (separate data and </a:t>
+            </a:r>
+            <a:r>
+              <a:rPr lang="en-US" dirty="0" err="1"/>
+              <a:t>instr</a:t>
+            </a:r>
+            <a:r>
+              <a:rPr lang="en-US" dirty="0"/>
+              <a:t> memory)</a:t>
+            </a:r>
+          </a:p>
+          <a:p>
+            <a:pPr lvl="1"/>
+            <a:r>
+              <a:rPr lang="en-US" dirty="0"/>
+              <a:t>Pipelined Multi Cycle Core, realistic memory latency</a:t>
+            </a:r>
+          </a:p>
+          <a:p>
+            <a:pPr lvl="1"/>
+            <a:r>
+              <a:rPr lang="en-US" dirty="0"/>
+              <a:t>Pipelined Multi Cycle Core, hierarchical memory</a:t>
+            </a:r>
+          </a:p>
+        </p:txBody>
+      </p:sp>
+    </p:spTree>
+    <p:extLst>
+      <p:ext uri="{BB962C8B-B14F-4D97-AF65-F5344CB8AC3E}">
+        <p14:creationId xmlns:p14="http://schemas.microsoft.com/office/powerpoint/2010/main" val="2988230929"/>
+      </p:ext>
+    </p:extLst>
+  </p:cSld>
+  <p:clrMapOvr>
+    <a:masterClrMapping/>
+  </p:clrMapOvr>
+</p:sld>
+</file>
+
+<file path=ppt/slides/slide9.xml><?xml version="1.0" encoding="utf-8"?>
+<p:sld xmlns:a="http://schemas.openxmlformats.org/drawingml/2006/main" xmlns:r="http://schemas.openxmlformats.org/officeDocument/2006/relationships" xmlns:p="http://schemas.openxmlformats.org/presentationml/2006/main">
+  <p:cSld>
+    <p:spTree>
+      <p:nvGrpSpPr>
+        <p:cNvPr id="1" name=""/>
+        <p:cNvGrpSpPr/>
+        <p:nvPr/>
+      </p:nvGrpSpPr>
+      <p:grpSpPr>
+        <a:xfrm>
+          <a:off x="0" y="0"/>
+          <a:ext cx="0" cy="0"/>
+          <a:chOff x="0" y="0"/>
+          <a:chExt cx="0" cy="0"/>
+        </a:xfrm>
+      </p:grpSpPr>
+      <p:sp>
+        <p:nvSpPr>
+          <p:cNvPr id="4" name="Title 3">
+            <a:extLst>
+              <a:ext uri="{FF2B5EF4-FFF2-40B4-BE49-F238E27FC236}">
+                <a16:creationId xmlns:a16="http://schemas.microsoft.com/office/drawing/2014/main" id="{C1909BB4-5187-B06F-B493-9586FAD68DC6}"/>
+              </a:ext>
+            </a:extLst>
+          </p:cNvPr>
+          <p:cNvSpPr>
+            <a:spLocks noGrp="1"/>
+          </p:cNvSpPr>
+          <p:nvPr>
+            <p:ph type="title"/>
+          </p:nvPr>
+        </p:nvSpPr>
+        <p:spPr/>
+        <p:txBody>
+          <a:bodyPr/>
+          <a:lstStyle/>
+          <a:p>
+            <a:r>
+              <a:rPr lang="en-US" dirty="0"/>
+              <a:t>References</a:t>
+            </a:r>
+            <a:endParaRPr lang="en-IN" dirty="0"/>
+          </a:p>
+        </p:txBody>
+      </p:sp>
+      <p:sp>
+        <p:nvSpPr>
+          <p:cNvPr id="5" name="Content Placeholder 4">
+            <a:extLst>
+              <a:ext uri="{FF2B5EF4-FFF2-40B4-BE49-F238E27FC236}">
+                <a16:creationId xmlns:a16="http://schemas.microsoft.com/office/drawing/2014/main" id="{70F7BD49-804D-739A-58E3-141DB9312BC1}"/>
+              </a:ext>
+            </a:extLst>
+          </p:cNvPr>
+          <p:cNvSpPr>
+            <a:spLocks noGrp="1"/>
+          </p:cNvSpPr>
+          <p:nvPr>
+            <p:ph idx="1"/>
+          </p:nvPr>
+        </p:nvSpPr>
+        <p:spPr/>
+        <p:txBody>
+          <a:bodyPr/>
+          <a:lstStyle/>
+          <a:p>
+            <a:r>
               <a:rPr lang="en-IN" dirty="0">
                 <a:hlinkClick r:id="rId2"/>
               </a:rPr>
@@ -20269,15 +21166,15 @@
           </a:p>
           <a:p>
             <a:r>
-              <a:rPr lang="en-IN" dirty="0">
+              <a:rPr lang="en-IN">
                 <a:hlinkClick r:id="rId3"/>
               </a:rPr>
               <a:t>https://cass-kul.github.io/</a:t>
             </a:r>
-            <a:endParaRPr lang="en-IN" dirty="0"/>
+            <a:endParaRPr lang="en-IN"/>
           </a:p>
           <a:p>
-            <a:endParaRPr lang="en-IN" dirty="0"/>
+            <a:endParaRPr lang="en-IN"/>
           </a:p>
         </p:txBody>
       </p:sp>
@@ -20549,4 +21446,299 @@
     </a:ext>
   </a:extLst>
 </a:theme>
+</file>
+
+<file path=ppt/theme/theme2.xml><?xml version="1.0" encoding="utf-8"?>
+<a:theme xmlns:a="http://schemas.openxmlformats.org/drawingml/2006/main" name="Office Theme">
+  <a:themeElements>
+    <a:clrScheme name="Office">
+      <a:dk1>
+        <a:sysClr val="windowText" lastClr="000000"/>
+      </a:dk1>
+      <a:lt1>
+        <a:sysClr val="window" lastClr="FFFFFF"/>
+      </a:lt1>
+      <a:dk2>
+        <a:srgbClr val="44546A"/>
+      </a:dk2>
+      <a:lt2>
+        <a:srgbClr val="E7E6E6"/>
+      </a:lt2>
+      <a:accent1>
+        <a:srgbClr val="4472C4"/>
+      </a:accent1>
+      <a:accent2>
+        <a:srgbClr val="ED7D31"/>
+      </a:accent2>
+      <a:accent3>
+        <a:srgbClr val="A5A5A5"/>
+      </a:accent3>
+      <a:accent4>
+        <a:srgbClr val="FFC000"/>
+      </a:accent4>
+      <a:accent5>
+        <a:srgbClr val="5B9BD5"/>
+      </a:accent5>
+      <a:accent6>
+        <a:srgbClr val="70AD47"/>
+      </a:accent6>
+      <a:hlink>
+        <a:srgbClr val="0563C1"/>
+      </a:hlink>
+      <a:folHlink>
+        <a:srgbClr val="954F72"/>
+      </a:folHlink>
+    </a:clrScheme>
+    <a:fontScheme name="Office">
+      <a:majorFont>
+        <a:latin typeface="Calibri Light" panose="020F0302020204030204"/>
+        <a:ea typeface=""/>
+        <a:cs typeface=""/>
+        <a:font script="Jpan" typeface="游ゴシック Light"/>
+        <a:font script="Hang" typeface="맑은 고딕"/>
+        <a:font script="Hans" typeface="等线 Light"/>
+        <a:font script="Hant" typeface="新細明體"/>
+        <a:font script="Arab" typeface="Times New Roman"/>
+        <a:font script="Hebr" typeface="Times New Roman"/>
+        <a:font script="Thai" typeface="Angsana New"/>
+        <a:font script="Ethi" typeface="Nyala"/>
+        <a:font script="Beng" typeface="Vrinda"/>
+        <a:font script="Gujr" typeface="Shruti"/>
+        <a:font script="Khmr" typeface="MoolBoran"/>
+        <a:font script="Knda" typeface="Tunga"/>
+        <a:font script="Guru" typeface="Raavi"/>
+        <a:font script="Cans" typeface="Euphemia"/>
+        <a:font script="Cher" typeface="Plantagenet Cherokee"/>
+        <a:font script="Yiii" typeface="Microsoft Yi Baiti"/>
+        <a:font script="Tibt" typeface="Microsoft Himalaya"/>
+        <a:font script="Thaa" typeface="MV Boli"/>
+        <a:font script="Deva" typeface="Mangal"/>
+        <a:font script="Telu" typeface="Gautami"/>
+        <a:font script="Taml" typeface="Latha"/>
+        <a:font script="Syrc" typeface="Estrangelo Edessa"/>
+        <a:font script="Orya" typeface="Kalinga"/>
+        <a:font script="Mlym" typeface="Kartika"/>
+        <a:font script="Laoo" typeface="DokChampa"/>
+        <a:font script="Sinh" typeface="Iskoola Pota"/>
+        <a:font script="Mong" typeface="Mongolian Baiti"/>
+        <a:font script="Viet" typeface="Times New Roman"/>
+        <a:font script="Uigh" typeface="Microsoft Uighur"/>
+        <a:font script="Geor" typeface="Sylfaen"/>
+        <a:font script="Armn" typeface="Arial"/>
+        <a:font script="Bugi" typeface="Leelawadee UI"/>
+        <a:font script="Bopo" typeface="Microsoft JhengHei"/>
+        <a:font script="Java" typeface="Javanese Text"/>
+        <a:font script="Lisu" typeface="Segoe UI"/>
+        <a:font script="Mymr" typeface="Myanmar Text"/>
+        <a:font script="Nkoo" typeface="Ebrima"/>
+        <a:font script="Olck" typeface="Nirmala UI"/>
+        <a:font script="Osma" typeface="Ebrima"/>
+        <a:font script="Phag" typeface="Phagspa"/>
+        <a:font script="Syrn" typeface="Estrangelo Edessa"/>
+        <a:font script="Syrj" typeface="Estrangelo Edessa"/>
+        <a:font script="Syre" typeface="Estrangelo Edessa"/>
+        <a:font script="Sora" typeface="Nirmala UI"/>
+        <a:font script="Tale" typeface="Microsoft Tai Le"/>
+        <a:font script="Talu" typeface="Microsoft New Tai Lue"/>
+        <a:font script="Tfng" typeface="Ebrima"/>
+      </a:majorFont>
+      <a:minorFont>
+        <a:latin typeface="Calibri" panose="020F0502020204030204"/>
+        <a:ea typeface=""/>
+        <a:cs typeface=""/>
+        <a:font script="Jpan" typeface="游ゴシック"/>
+        <a:font script="Hang" typeface="맑은 고딕"/>
+        <a:font script="Hans" typeface="等线"/>
+        <a:font script="Hant" typeface="新細明體"/>
+        <a:font script="Arab" typeface="Arial"/>
+        <a:font script="Hebr" typeface="Arial"/>
+        <a:font script="Thai" typeface="Cordia New"/>
+        <a:font script="Ethi" typeface="Nyala"/>
+        <a:font script="Beng" typeface="Vrinda"/>
+        <a:font script="Gujr" typeface="Shruti"/>
+        <a:font script="Khmr" typeface="DaunPenh"/>
+        <a:font script="Knda" typeface="Tunga"/>
+        <a:font script="Guru" typeface="Raavi"/>
+        <a:font script="Cans" typeface="Euphemia"/>
+        <a:font script="Cher" typeface="Plantagenet Cherokee"/>
+        <a:font script="Yiii" typeface="Microsoft Yi Baiti"/>
+        <a:font script="Tibt" typeface="Microsoft Himalaya"/>
+        <a:font script="Thaa" typeface="MV Boli"/>
+        <a:font script="Deva" typeface="Mangal"/>
+        <a:font script="Telu" typeface="Gautami"/>
+        <a:font script="Taml" typeface="Latha"/>
+        <a:font script="Syrc" typeface="Estrangelo Edessa"/>
+        <a:font script="Orya" typeface="Kalinga"/>
+        <a:font script="Mlym" typeface="Kartika"/>
+        <a:font script="Laoo" typeface="DokChampa"/>
+        <a:font script="Sinh" typeface="Iskoola Pota"/>
+        <a:font script="Mong" typeface="Mongolian Baiti"/>
+        <a:font script="Viet" typeface="Arial"/>
+        <a:font script="Uigh" typeface="Microsoft Uighur"/>
+        <a:font script="Geor" typeface="Sylfaen"/>
+        <a:font script="Armn" typeface="Arial"/>
+        <a:font script="Bugi" typeface="Leelawadee UI"/>
+        <a:font script="Bopo" typeface="Microsoft JhengHei"/>
+        <a:font script="Java" typeface="Javanese Text"/>
+        <a:font script="Lisu" typeface="Segoe UI"/>
+        <a:font script="Mymr" typeface="Myanmar Text"/>
+        <a:font script="Nkoo" typeface="Ebrima"/>
+        <a:font script="Olck" typeface="Nirmala UI"/>
+        <a:font script="Osma" typeface="Ebrima"/>
+        <a:font script="Phag" typeface="Phagspa"/>
+        <a:font script="Syrn" typeface="Estrangelo Edessa"/>
+        <a:font script="Syrj" typeface="Estrangelo Edessa"/>
+        <a:font script="Syre" typeface="Estrangelo Edessa"/>
+        <a:font script="Sora" typeface="Nirmala UI"/>
+        <a:font script="Tale" typeface="Microsoft Tai Le"/>
+        <a:font script="Talu" typeface="Microsoft New Tai Lue"/>
+        <a:font script="Tfng" typeface="Ebrima"/>
+      </a:minorFont>
+    </a:fontScheme>
+    <a:fmtScheme name="Office">
+      <a:fillStyleLst>
+        <a:solidFill>
+          <a:schemeClr val="phClr"/>
+        </a:solidFill>
+        <a:gradFill rotWithShape="1">
+          <a:gsLst>
+            <a:gs pos="0">
+              <a:schemeClr val="phClr">
+                <a:lumMod val="110000"/>
+                <a:satMod val="105000"/>
+                <a:tint val="67000"/>
+              </a:schemeClr>
+            </a:gs>
+            <a:gs pos="50000">
+              <a:schemeClr val="phClr">
+                <a:lumMod val="105000"/>
+                <a:satMod val="103000"/>
+                <a:tint val="73000"/>
+              </a:schemeClr>
+            </a:gs>
+            <a:gs pos="100000">
+              <a:schemeClr val="phClr">
+                <a:lumMod val="105000"/>
+                <a:satMod val="109000"/>
+                <a:tint val="81000"/>
+              </a:schemeClr>
+            </a:gs>
+          </a:gsLst>
+          <a:lin ang="5400000" scaled="0"/>
+        </a:gradFill>
+        <a:gradFill rotWithShape="1">
+          <a:gsLst>
+            <a:gs pos="0">
+              <a:schemeClr val="phClr">
+                <a:satMod val="103000"/>
+                <a:lumMod val="102000"/>
+                <a:tint val="94000"/>
+              </a:schemeClr>
+            </a:gs>
+            <a:gs pos="50000">
+              <a:schemeClr val="phClr">
+                <a:satMod val="110000"/>
+                <a:lumMod val="100000"/>
+                <a:shade val="100000"/>
+              </a:schemeClr>
+            </a:gs>
+            <a:gs pos="100000">
+              <a:schemeClr val="phClr">
+                <a:lumMod val="99000"/>
+                <a:satMod val="120000"/>
+                <a:shade val="78000"/>
+              </a:schemeClr>
+            </a:gs>
+          </a:gsLst>
+          <a:lin ang="5400000" scaled="0"/>
+        </a:gradFill>
+      </a:fillStyleLst>
+      <a:lnStyleLst>
+        <a:ln w="6350" cap="flat" cmpd="sng" algn="ctr">
+          <a:solidFill>
+            <a:schemeClr val="phClr"/>
+          </a:solidFill>
+          <a:prstDash val="solid"/>
+          <a:miter lim="800000"/>
+        </a:ln>
+        <a:ln w="12700" cap="flat" cmpd="sng" algn="ctr">
+          <a:solidFill>
+            <a:schemeClr val="phClr"/>
+          </a:solidFill>
+          <a:prstDash val="solid"/>
+          <a:miter lim="800000"/>
+        </a:ln>
+        <a:ln w="19050" cap="flat" cmpd="sng" algn="ctr">
+          <a:solidFill>
+            <a:schemeClr val="phClr"/>
+          </a:solidFill>
+          <a:prstDash val="solid"/>
+          <a:miter lim="800000"/>
+        </a:ln>
+      </a:lnStyleLst>
+      <a:effectStyleLst>
+        <a:effectStyle>
+          <a:effectLst/>
+        </a:effectStyle>
+        <a:effectStyle>
+          <a:effectLst/>
+        </a:effectStyle>
+        <a:effectStyle>
+          <a:effectLst>
+            <a:outerShdw blurRad="57150" dist="19050" dir="5400000" algn="ctr" rotWithShape="0">
+              <a:srgbClr val="000000">
+                <a:alpha val="63000"/>
+              </a:srgbClr>
+            </a:outerShdw>
+          </a:effectLst>
+        </a:effectStyle>
+      </a:effectStyleLst>
+      <a:bgFillStyleLst>
+        <a:solidFill>
+          <a:schemeClr val="phClr"/>
+        </a:solidFill>
+        <a:solidFill>
+          <a:schemeClr val="phClr">
+            <a:tint val="95000"/>
+            <a:satMod val="170000"/>
+          </a:schemeClr>
+        </a:solidFill>
+        <a:gradFill rotWithShape="1">
+          <a:gsLst>
+            <a:gs pos="0">
+              <a:schemeClr val="phClr">
+                <a:tint val="93000"/>
+                <a:satMod val="150000"/>
+                <a:shade val="98000"/>
+                <a:lumMod val="102000"/>
+              </a:schemeClr>
+            </a:gs>
+            <a:gs pos="50000">
+              <a:schemeClr val="phClr">
+                <a:tint val="98000"/>
+                <a:satMod val="130000"/>
+                <a:shade val="90000"/>
+                <a:lumMod val="103000"/>
+              </a:schemeClr>
+            </a:gs>
+            <a:gs pos="100000">
+              <a:schemeClr val="phClr">
+                <a:shade val="63000"/>
+                <a:satMod val="120000"/>
+              </a:schemeClr>
+            </a:gs>
+          </a:gsLst>
+          <a:lin ang="5400000" scaled="0"/>
+        </a:gradFill>
+      </a:bgFillStyleLst>
+    </a:fmtScheme>
+  </a:themeElements>
+  <a:objectDefaults/>
+  <a:extraClrSchemeLst/>
+  <a:extLst>
+    <a:ext uri="{05A4C25C-085E-4340-85A3-A5531E510DB2}">
+      <thm15:themeFamily xmlns:thm15="http://schemas.microsoft.com/office/thememl/2012/main" name="Office Theme" id="{62F939B6-93AF-4DB8-9C6B-D6C7DFDC589F}" vid="{4A3C46E8-61CC-4603-A589-7422A47A8E4A}"/>
+    </a:ext>
+  </a:extLst>
+</a:theme>
 </file>
</xml_diff>

<commit_message>
updated documentation and results
</commit_message>
<xml_diff>
--- a/readme.pptx
+++ b/readme.pptx
@@ -5,7 +5,7 @@
     <p:sldMasterId id="2147483708" r:id="rId1"/>
   </p:sldMasterIdLst>
   <p:notesMasterIdLst>
-    <p:notesMasterId r:id="rId11"/>
+    <p:notesMasterId r:id="rId12"/>
   </p:notesMasterIdLst>
   <p:sldIdLst>
     <p:sldId id="256" r:id="rId2"/>
@@ -15,8 +15,9 @@
     <p:sldId id="260" r:id="rId6"/>
     <p:sldId id="262" r:id="rId7"/>
     <p:sldId id="263" r:id="rId8"/>
-    <p:sldId id="264" r:id="rId9"/>
-    <p:sldId id="261" r:id="rId10"/>
+    <p:sldId id="265" r:id="rId9"/>
+    <p:sldId id="264" r:id="rId10"/>
+    <p:sldId id="261" r:id="rId11"/>
   </p:sldIdLst>
   <p:sldSz cx="12192000" cy="6858000"/>
   <p:notesSz cx="6858000" cy="9144000"/>
@@ -126,6 +127,53 @@
 <file path=ppt/changesInfos/changesInfo1.xml><?xml version="1.0" encoding="utf-8"?>
 <pc:chgInfo xmlns:a="http://schemas.openxmlformats.org/drawingml/2006/main" xmlns:r="http://schemas.openxmlformats.org/officeDocument/2006/relationships" xmlns:ac="http://schemas.microsoft.com/office/drawing/2013/main/command" xmlns:pc="http://schemas.microsoft.com/office/powerpoint/2013/main/command">
   <pc:docChgLst>
+    <pc:chgData name="Mrinav Saxena" userId="1ae1cb636c956b49" providerId="LiveId" clId="{3D40DB4B-8E00-40BA-9204-277439F83DB8}"/>
+    <pc:docChg chg="undo custSel addSld modSld sldOrd">
+      <pc:chgData name="Mrinav Saxena" userId="1ae1cb636c956b49" providerId="LiveId" clId="{3D40DB4B-8E00-40BA-9204-277439F83DB8}" dt="2025-09-20T18:06:24.157" v="703"/>
+      <pc:docMkLst>
+        <pc:docMk/>
+      </pc:docMkLst>
+      <pc:sldChg chg="modSp mod">
+        <pc:chgData name="Mrinav Saxena" userId="1ae1cb636c956b49" providerId="LiveId" clId="{3D40DB4B-8E00-40BA-9204-277439F83DB8}" dt="2025-09-20T18:02:56.422" v="23" actId="20577"/>
+        <pc:sldMkLst>
+          <pc:docMk/>
+          <pc:sldMk cId="2988230929" sldId="264"/>
+        </pc:sldMkLst>
+        <pc:spChg chg="mod">
+          <ac:chgData name="Mrinav Saxena" userId="1ae1cb636c956b49" providerId="LiveId" clId="{3D40DB4B-8E00-40BA-9204-277439F83DB8}" dt="2025-09-20T18:02:56.422" v="23" actId="20577"/>
+          <ac:spMkLst>
+            <pc:docMk/>
+            <pc:sldMk cId="2988230929" sldId="264"/>
+            <ac:spMk id="5" creationId="{1A5A8427-A94F-8387-AA02-5D06EEAC6365}"/>
+          </ac:spMkLst>
+        </pc:spChg>
+      </pc:sldChg>
+      <pc:sldChg chg="modSp new mod ord">
+        <pc:chgData name="Mrinav Saxena" userId="1ae1cb636c956b49" providerId="LiveId" clId="{3D40DB4B-8E00-40BA-9204-277439F83DB8}" dt="2025-09-20T18:06:24.157" v="703"/>
+        <pc:sldMkLst>
+          <pc:docMk/>
+          <pc:sldMk cId="2632116336" sldId="265"/>
+        </pc:sldMkLst>
+        <pc:spChg chg="mod">
+          <ac:chgData name="Mrinav Saxena" userId="1ae1cb636c956b49" providerId="LiveId" clId="{3D40DB4B-8E00-40BA-9204-277439F83DB8}" dt="2025-09-20T18:03:05.597" v="32" actId="20577"/>
+          <ac:spMkLst>
+            <pc:docMk/>
+            <pc:sldMk cId="2632116336" sldId="265"/>
+            <ac:spMk id="2" creationId="{BF3EE57E-5E45-CA90-0FCD-F27BF75D026D}"/>
+          </ac:spMkLst>
+        </pc:spChg>
+        <pc:spChg chg="mod">
+          <ac:chgData name="Mrinav Saxena" userId="1ae1cb636c956b49" providerId="LiveId" clId="{3D40DB4B-8E00-40BA-9204-277439F83DB8}" dt="2025-09-20T18:06:19.446" v="701" actId="20577"/>
+          <ac:spMkLst>
+            <pc:docMk/>
+            <pc:sldMk cId="2632116336" sldId="265"/>
+            <ac:spMk id="3" creationId="{FC84378D-7372-7709-4268-451C41F851DF}"/>
+          </ac:spMkLst>
+        </pc:spChg>
+      </pc:sldChg>
+    </pc:docChg>
+  </pc:docChgLst>
+  <pc:docChgLst>
     <pc:chgData name="Mrinav Saxena" userId="1ae1cb636c956b49" providerId="LiveId" clId="{A2E5E654-390A-46A7-A8C6-614B0BD28A59}"/>
     <pc:docChg chg="undo redo custSel addSld modSld">
       <pc:chgData name="Mrinav Saxena" userId="1ae1cb636c956b49" providerId="LiveId" clId="{A2E5E654-390A-46A7-A8C6-614B0BD28A59}" dt="2025-09-04T17:31:49.156" v="2924" actId="20577"/>
@@ -176,22 +224,6 @@
           <pc:docMk/>
           <pc:sldMk cId="2988230929" sldId="264"/>
         </pc:sldMkLst>
-        <pc:spChg chg="del mod ord">
-          <ac:chgData name="Mrinav Saxena" userId="1ae1cb636c956b49" providerId="LiveId" clId="{A2E5E654-390A-46A7-A8C6-614B0BD28A59}" dt="2025-09-03T17:34:37.079" v="2463" actId="700"/>
-          <ac:spMkLst>
-            <pc:docMk/>
-            <pc:sldMk cId="2988230929" sldId="264"/>
-            <ac:spMk id="2" creationId="{65D89EE9-5B3C-9A36-082D-A7860E8CC707}"/>
-          </ac:spMkLst>
-        </pc:spChg>
-        <pc:spChg chg="del mod ord">
-          <ac:chgData name="Mrinav Saxena" userId="1ae1cb636c956b49" providerId="LiveId" clId="{A2E5E654-390A-46A7-A8C6-614B0BD28A59}" dt="2025-09-03T17:34:37.079" v="2463" actId="700"/>
-          <ac:spMkLst>
-            <pc:docMk/>
-            <pc:sldMk cId="2988230929" sldId="264"/>
-            <ac:spMk id="3" creationId="{FE13605A-C43E-4880-8AB6-D316EB42E4B9}"/>
-          </ac:spMkLst>
-        </pc:spChg>
         <pc:spChg chg="add mod ord">
           <ac:chgData name="Mrinav Saxena" userId="1ae1cb636c956b49" providerId="LiveId" clId="{A2E5E654-390A-46A7-A8C6-614B0BD28A59}" dt="2025-09-03T17:35:06.546" v="2466" actId="20577"/>
           <ac:spMkLst>
@@ -296,7 +328,7 @@
           <a:p>
             <a:fld id="{ABA18496-2C08-4E1B-8E2C-B9C3C1BFD0C6}" type="datetimeFigureOut">
               <a:rPr lang="en-IN" smtClean="0"/>
-              <a:t>03-09-2025</a:t>
+              <a:t>20-09-2025</a:t>
             </a:fld>
             <a:endParaRPr lang="en-IN"/>
           </a:p>
@@ -717,7 +749,7 @@
           <a:p>
             <a:fld id="{9705557C-6348-43CC-A73A-4CBAAF49F69E}" type="slidenum">
               <a:rPr lang="en-IN" smtClean="0"/>
-              <a:t>8</a:t>
+              <a:t>9</a:t>
             </a:fld>
             <a:endParaRPr lang="en-IN"/>
           </a:p>
@@ -2143,7 +2175,7 @@
             <a:fld id="{48A87A34-81AB-432B-8DAE-1953F412C126}" type="datetimeFigureOut">
               <a:rPr lang="en-US" smtClean="0"/>
               <a:pPr/>
-              <a:t>9/3/2025</a:t>
+              <a:t>9/20/2025</a:t>
             </a:fld>
             <a:endParaRPr lang="en-US" dirty="0"/>
           </a:p>
@@ -3673,7 +3705,7 @@
           <a:p>
             <a:fld id="{48A87A34-81AB-432B-8DAE-1953F412C126}" type="datetimeFigureOut">
               <a:rPr lang="en-US" smtClean="0"/>
-              <a:t>9/3/2025</a:t>
+              <a:t>9/20/2025</a:t>
             </a:fld>
             <a:endParaRPr lang="en-US" dirty="0"/>
           </a:p>
@@ -5209,7 +5241,7 @@
           <a:p>
             <a:fld id="{48A87A34-81AB-432B-8DAE-1953F412C126}" type="datetimeFigureOut">
               <a:rPr lang="en-US" smtClean="0"/>
-              <a:t>9/3/2025</a:t>
+              <a:t>9/20/2025</a:t>
             </a:fld>
             <a:endParaRPr lang="en-US" dirty="0"/>
           </a:p>
@@ -6664,7 +6696,7 @@
           <a:p>
             <a:fld id="{48A87A34-81AB-432B-8DAE-1953F412C126}" type="datetimeFigureOut">
               <a:rPr lang="en-US" smtClean="0"/>
-              <a:t>9/3/2025</a:t>
+              <a:t>9/20/2025</a:t>
             </a:fld>
             <a:endParaRPr lang="en-US" dirty="0"/>
           </a:p>
@@ -8117,7 +8149,7 @@
           <a:p>
             <a:fld id="{48A87A34-81AB-432B-8DAE-1953F412C126}" type="datetimeFigureOut">
               <a:rPr lang="en-US" smtClean="0"/>
-              <a:t>9/3/2025</a:t>
+              <a:t>9/20/2025</a:t>
             </a:fld>
             <a:endParaRPr lang="en-US" dirty="0"/>
           </a:p>
@@ -9572,7 +9604,7 @@
           <a:p>
             <a:fld id="{48A87A34-81AB-432B-8DAE-1953F412C126}" type="datetimeFigureOut">
               <a:rPr lang="en-US" smtClean="0"/>
-              <a:t>9/3/2025</a:t>
+              <a:t>9/20/2025</a:t>
             </a:fld>
             <a:endParaRPr lang="en-US" dirty="0"/>
           </a:p>
@@ -11047,7 +11079,7 @@
           <a:p>
             <a:fld id="{48A87A34-81AB-432B-8DAE-1953F412C126}" type="datetimeFigureOut">
               <a:rPr lang="en-US" smtClean="0"/>
-              <a:t>9/3/2025</a:t>
+              <a:t>9/20/2025</a:t>
             </a:fld>
             <a:endParaRPr lang="en-US" dirty="0"/>
           </a:p>
@@ -12522,7 +12554,7 @@
           <a:p>
             <a:fld id="{48A87A34-81AB-432B-8DAE-1953F412C126}" type="datetimeFigureOut">
               <a:rPr lang="en-US" smtClean="0"/>
-              <a:t>9/3/2025</a:t>
+              <a:t>9/20/2025</a:t>
             </a:fld>
             <a:endParaRPr lang="en-US" dirty="0"/>
           </a:p>
@@ -14030,7 +14062,7 @@
           <a:p>
             <a:fld id="{48A87A34-81AB-432B-8DAE-1953F412C126}" type="datetimeFigureOut">
               <a:rPr lang="en-US" smtClean="0"/>
-              <a:t>9/3/2025</a:t>
+              <a:t>9/20/2025</a:t>
             </a:fld>
             <a:endParaRPr lang="en-US" dirty="0"/>
           </a:p>
@@ -15551,7 +15583,7 @@
           <a:p>
             <a:fld id="{48A87A34-81AB-432B-8DAE-1953F412C126}" type="datetimeFigureOut">
               <a:rPr lang="en-US" smtClean="0"/>
-              <a:t>9/3/2025</a:t>
+              <a:t>9/20/2025</a:t>
             </a:fld>
             <a:endParaRPr lang="en-US" dirty="0"/>
           </a:p>
@@ -17216,7 +17248,7 @@
           <a:p>
             <a:fld id="{48A87A34-81AB-432B-8DAE-1953F412C126}" type="datetimeFigureOut">
               <a:rPr lang="en-US" smtClean="0"/>
-              <a:t>9/3/2025</a:t>
+              <a:t>9/20/2025</a:t>
             </a:fld>
             <a:endParaRPr lang="en-US" dirty="0"/>
           </a:p>
@@ -18614,7 +18646,7 @@
           <a:p>
             <a:fld id="{48A87A34-81AB-432B-8DAE-1953F412C126}" type="datetimeFigureOut">
               <a:rPr lang="en-US" smtClean="0"/>
-              <a:t>9/3/2025</a:t>
+              <a:t>9/20/2025</a:t>
             </a:fld>
             <a:endParaRPr lang="en-US" dirty="0"/>
           </a:p>
@@ -18714,7 +18746,7 @@
           <a:p>
             <a:fld id="{48A87A34-81AB-432B-8DAE-1953F412C126}" type="datetimeFigureOut">
               <a:rPr lang="en-US" smtClean="0"/>
-              <a:t>9/3/2025</a:t>
+              <a:t>9/20/2025</a:t>
             </a:fld>
             <a:endParaRPr lang="en-US" dirty="0"/>
           </a:p>
@@ -18938,7 +18970,7 @@
             <a:fld id="{48A87A34-81AB-432B-8DAE-1953F412C126}" type="datetimeFigureOut">
               <a:rPr lang="en-US" smtClean="0"/>
               <a:pPr/>
-              <a:t>9/3/2025</a:t>
+              <a:t>9/20/2025</a:t>
             </a:fld>
             <a:endParaRPr lang="en-US" dirty="0"/>
           </a:p>
@@ -19463,6 +19495,108 @@
 </p:sld>
 </file>
 
+<file path=ppt/slides/slide10.xml><?xml version="1.0" encoding="utf-8"?>
+<p:sld xmlns:a="http://schemas.openxmlformats.org/drawingml/2006/main" xmlns:r="http://schemas.openxmlformats.org/officeDocument/2006/relationships" xmlns:p="http://schemas.openxmlformats.org/presentationml/2006/main">
+  <p:cSld>
+    <p:spTree>
+      <p:nvGrpSpPr>
+        <p:cNvPr id="1" name=""/>
+        <p:cNvGrpSpPr/>
+        <p:nvPr/>
+      </p:nvGrpSpPr>
+      <p:grpSpPr>
+        <a:xfrm>
+          <a:off x="0" y="0"/>
+          <a:ext cx="0" cy="0"/>
+          <a:chOff x="0" y="0"/>
+          <a:chExt cx="0" cy="0"/>
+        </a:xfrm>
+      </p:grpSpPr>
+      <p:sp>
+        <p:nvSpPr>
+          <p:cNvPr id="4" name="Title 3">
+            <a:extLst>
+              <a:ext uri="{FF2B5EF4-FFF2-40B4-BE49-F238E27FC236}">
+                <a16:creationId xmlns:a16="http://schemas.microsoft.com/office/drawing/2014/main" id="{C1909BB4-5187-B06F-B493-9586FAD68DC6}"/>
+              </a:ext>
+            </a:extLst>
+          </p:cNvPr>
+          <p:cNvSpPr>
+            <a:spLocks noGrp="1"/>
+          </p:cNvSpPr>
+          <p:nvPr>
+            <p:ph type="title"/>
+          </p:nvPr>
+        </p:nvSpPr>
+        <p:spPr/>
+        <p:txBody>
+          <a:bodyPr/>
+          <a:lstStyle/>
+          <a:p>
+            <a:r>
+              <a:rPr lang="en-US" dirty="0"/>
+              <a:t>References</a:t>
+            </a:r>
+            <a:endParaRPr lang="en-IN" dirty="0"/>
+          </a:p>
+        </p:txBody>
+      </p:sp>
+      <p:sp>
+        <p:nvSpPr>
+          <p:cNvPr id="5" name="Content Placeholder 4">
+            <a:extLst>
+              <a:ext uri="{FF2B5EF4-FFF2-40B4-BE49-F238E27FC236}">
+                <a16:creationId xmlns:a16="http://schemas.microsoft.com/office/drawing/2014/main" id="{70F7BD49-804D-739A-58E3-141DB9312BC1}"/>
+              </a:ext>
+            </a:extLst>
+          </p:cNvPr>
+          <p:cNvSpPr>
+            <a:spLocks noGrp="1"/>
+          </p:cNvSpPr>
+          <p:nvPr>
+            <p:ph idx="1"/>
+          </p:nvPr>
+        </p:nvSpPr>
+        <p:spPr/>
+        <p:txBody>
+          <a:bodyPr/>
+          <a:lstStyle/>
+          <a:p>
+            <a:r>
+              <a:rPr lang="en-IN" dirty="0">
+                <a:hlinkClick r:id="rId2"/>
+              </a:rPr>
+              <a:t>https://veripool.org/guide/latest/exe_verilator.html</a:t>
+            </a:r>
+            <a:endParaRPr lang="en-IN" dirty="0"/>
+          </a:p>
+          <a:p>
+            <a:r>
+              <a:rPr lang="en-IN">
+                <a:hlinkClick r:id="rId3"/>
+              </a:rPr>
+              <a:t>https://cass-kul.github.io/</a:t>
+            </a:r>
+            <a:endParaRPr lang="en-IN"/>
+          </a:p>
+          <a:p>
+            <a:endParaRPr lang="en-IN"/>
+          </a:p>
+        </p:txBody>
+      </p:sp>
+    </p:spTree>
+    <p:extLst>
+      <p:ext uri="{BB962C8B-B14F-4D97-AF65-F5344CB8AC3E}">
+        <p14:creationId xmlns:p14="http://schemas.microsoft.com/office/powerpoint/2010/main" val="1431337137"/>
+      </p:ext>
+    </p:extLst>
+  </p:cSld>
+  <p:clrMapOvr>
+    <a:masterClrMapping/>
+  </p:clrMapOvr>
+</p:sld>
+</file>
+
 <file path=ppt/slides/slide2.xml><?xml version="1.0" encoding="utf-8"?>
 <p:sld xmlns:a="http://schemas.openxmlformats.org/drawingml/2006/main" xmlns:r="http://schemas.openxmlformats.org/officeDocument/2006/relationships" xmlns:p="http://schemas.openxmlformats.org/presentationml/2006/main">
   <p:cSld>
@@ -20956,10 +21090,10 @@
       </p:grpSpPr>
       <p:sp>
         <p:nvSpPr>
-          <p:cNvPr id="4" name="Title 3">
+          <p:cNvPr id="2" name="Title 1">
             <a:extLst>
               <a:ext uri="{FF2B5EF4-FFF2-40B4-BE49-F238E27FC236}">
-                <a16:creationId xmlns:a16="http://schemas.microsoft.com/office/drawing/2014/main" id="{CBDFBB19-9E5B-A3F1-6C30-618BEBD0074C}"/>
+                <a16:creationId xmlns:a16="http://schemas.microsoft.com/office/drawing/2014/main" id="{BF3EE57E-5E45-CA90-0FCD-F27BF75D026D}"/>
               </a:ext>
             </a:extLst>
           </p:cNvPr>
@@ -20977,7 +21111,7 @@
           <a:p>
             <a:r>
               <a:rPr lang="en-US" dirty="0"/>
-              <a:t>TBD</a:t>
+              <a:t>Env Plan</a:t>
             </a:r>
             <a:endParaRPr lang="en-IN" dirty="0"/>
           </a:p>
@@ -20985,10 +21119,10 @@
       </p:sp>
       <p:sp>
         <p:nvSpPr>
-          <p:cNvPr id="5" name="Content Placeholder 4">
+          <p:cNvPr id="3" name="Content Placeholder 2">
             <a:extLst>
               <a:ext uri="{FF2B5EF4-FFF2-40B4-BE49-F238E27FC236}">
-                <a16:creationId xmlns:a16="http://schemas.microsoft.com/office/drawing/2014/main" id="{1A5A8427-A94F-8387-AA02-5D06EEAC6365}"/>
+                <a16:creationId xmlns:a16="http://schemas.microsoft.com/office/drawing/2014/main" id="{FC84378D-7372-7709-4268-451C41F851DF}"/>
               </a:ext>
             </a:extLst>
           </p:cNvPr>
@@ -21009,24 +21143,63 @@
               <a:buAutoNum type="arabicPeriod"/>
             </a:pPr>
             <a:r>
-              <a:rPr lang="en-IN" dirty="0"/>
-              <a:t>Environment</a:t>
+              <a:rPr lang="en-US" dirty="0"/>
+              <a:t>In order to check the functional correctness of an implementation, the plan is to –</a:t>
             </a:r>
           </a:p>
           <a:p>
-            <a:pPr lvl="1"/>
-            <a:r>
-              <a:rPr lang="en-IN" dirty="0"/>
-              <a:t>Add testbench infra / classes that run checks on code</a:t>
+            <a:pPr marL="800100" lvl="1" indent="-342900">
+              <a:buFont typeface="+mj-lt"/>
+              <a:buAutoNum type="arabicPeriod"/>
+            </a:pPr>
+            <a:r>
+              <a:rPr lang="en-US" dirty="0"/>
+              <a:t>Compare any test run’s resultant memory (</a:t>
+            </a:r>
+            <a:r>
+              <a:rPr lang="en-US" dirty="0" err="1"/>
+              <a:t>res_dmem.hex</a:t>
+            </a:r>
+            <a:r>
+              <a:rPr lang="en-US" dirty="0"/>
+              <a:t>) with that of the same test on </a:t>
+            </a:r>
+            <a:r>
+              <a:rPr lang="en-US" dirty="0" err="1"/>
+              <a:t>single_cycle_core</a:t>
+            </a:r>
+            <a:r>
+              <a:rPr lang="en-US" dirty="0"/>
+              <a:t>.</a:t>
             </a:r>
           </a:p>
           <a:p>
-            <a:pPr lvl="1"/>
-            <a:r>
-              <a:rPr lang="en-IN" dirty="0"/>
-              <a:t>Add testbench infra / classes that track execution performance</a:t>
-            </a:r>
-            <a:endParaRPr lang="en-US" dirty="0"/>
+            <a:pPr marL="800100" lvl="1" indent="-342900">
+              <a:buFont typeface="+mj-lt"/>
+              <a:buAutoNum type="arabicPeriod"/>
+            </a:pPr>
+            <a:r>
+              <a:rPr lang="en-US" dirty="0"/>
+              <a:t>Compare </a:t>
+            </a:r>
+            <a:r>
+              <a:rPr lang="en-US" dirty="0" err="1"/>
+              <a:t>pc_seq.hex</a:t>
+            </a:r>
+            <a:r>
+              <a:rPr lang="en-US" dirty="0"/>
+              <a:t> to confirm that fetch order is the same, though this will become problematic if pre-fetch / speculative logic is added.</a:t>
+            </a:r>
+          </a:p>
+          <a:p>
+            <a:pPr marL="800100" lvl="1" indent="-342900">
+              <a:buFont typeface="+mj-lt"/>
+              <a:buAutoNum type="arabicPeriod"/>
+            </a:pPr>
+            <a:r>
+              <a:rPr lang="en-US" dirty="0"/>
+              <a:t>Find a way to confirm if commits are in order.</a:t>
+            </a:r>
           </a:p>
           <a:p>
             <a:pPr marL="342900" indent="-342900">
@@ -21034,44 +21207,18 @@
               <a:buAutoNum type="arabicPeriod"/>
             </a:pPr>
             <a:r>
-              <a:rPr lang="en-US" dirty="0"/>
-              <a:t>Implementation</a:t>
+              <a:rPr lang="en-IN" dirty="0"/>
+              <a:t>Some infra in the testbench (needs to be common and easily importable) for building a tarmac log.</a:t>
             </a:r>
           </a:p>
           <a:p>
-            <a:pPr lvl="1"/>
-            <a:r>
-              <a:rPr lang="en-US" dirty="0"/>
-              <a:t>Exceptions, Traps and Interrupts</a:t>
-            </a:r>
-          </a:p>
-          <a:p>
-            <a:pPr lvl="1"/>
-            <a:r>
-              <a:rPr lang="en-US" dirty="0"/>
-              <a:t>Single Cycle Core (separate data and </a:t>
-            </a:r>
-            <a:r>
-              <a:rPr lang="en-US" dirty="0" err="1"/>
-              <a:t>instr</a:t>
-            </a:r>
-            <a:r>
-              <a:rPr lang="en-US" dirty="0"/>
-              <a:t> memory)</a:t>
-            </a:r>
-          </a:p>
-          <a:p>
-            <a:pPr lvl="1"/>
-            <a:r>
-              <a:rPr lang="en-US" dirty="0"/>
-              <a:t>Pipelined Multi Cycle Core, realistic memory latency</a:t>
-            </a:r>
-          </a:p>
-          <a:p>
-            <a:pPr lvl="1"/>
-            <a:r>
-              <a:rPr lang="en-US" dirty="0"/>
-              <a:t>Pipelined Multi Cycle Core, hierarchical memory</a:t>
+            <a:pPr marL="342900" indent="-342900">
+              <a:buFont typeface="+mj-lt"/>
+              <a:buAutoNum type="arabicPeriod"/>
+            </a:pPr>
+            <a:r>
+              <a:rPr lang="en-IN" dirty="0"/>
+              <a:t>From a performance perspective, some infra is needed to tally CPI, stalls, etc.</a:t>
             </a:r>
           </a:p>
         </p:txBody>
@@ -21079,7 +21226,7 @@
     </p:spTree>
     <p:extLst>
       <p:ext uri="{BB962C8B-B14F-4D97-AF65-F5344CB8AC3E}">
-        <p14:creationId xmlns:p14="http://schemas.microsoft.com/office/powerpoint/2010/main" val="2988230929"/>
+        <p14:creationId xmlns:p14="http://schemas.microsoft.com/office/powerpoint/2010/main" val="2632116336"/>
       </p:ext>
     </p:extLst>
   </p:cSld>
@@ -21111,7 +21258,7 @@
           <p:cNvPr id="4" name="Title 3">
             <a:extLst>
               <a:ext uri="{FF2B5EF4-FFF2-40B4-BE49-F238E27FC236}">
-                <a16:creationId xmlns:a16="http://schemas.microsoft.com/office/drawing/2014/main" id="{C1909BB4-5187-B06F-B493-9586FAD68DC6}"/>
+                <a16:creationId xmlns:a16="http://schemas.microsoft.com/office/drawing/2014/main" id="{CBDFBB19-9E5B-A3F1-6C30-618BEBD0074C}"/>
               </a:ext>
             </a:extLst>
           </p:cNvPr>
@@ -21129,7 +21276,7 @@
           <a:p>
             <a:r>
               <a:rPr lang="en-US" dirty="0"/>
-              <a:t>References</a:t>
+              <a:t>TBD</a:t>
             </a:r>
             <a:endParaRPr lang="en-IN" dirty="0"/>
           </a:p>
@@ -21140,7 +21287,7 @@
           <p:cNvPr id="5" name="Content Placeholder 4">
             <a:extLst>
               <a:ext uri="{FF2B5EF4-FFF2-40B4-BE49-F238E27FC236}">
-                <a16:creationId xmlns:a16="http://schemas.microsoft.com/office/drawing/2014/main" id="{70F7BD49-804D-739A-58E3-141DB9312BC1}"/>
+                <a16:creationId xmlns:a16="http://schemas.microsoft.com/office/drawing/2014/main" id="{1A5A8427-A94F-8387-AA02-5D06EEAC6365}"/>
               </a:ext>
             </a:extLst>
           </p:cNvPr>
@@ -21156,32 +21303,60 @@
           <a:bodyPr/>
           <a:lstStyle/>
           <a:p>
-            <a:r>
-              <a:rPr lang="en-IN" dirty="0">
-                <a:hlinkClick r:id="rId2"/>
-              </a:rPr>
-              <a:t>https://veripool.org/guide/latest/exe_verilator.html</a:t>
-            </a:r>
-            <a:endParaRPr lang="en-IN" dirty="0"/>
+            <a:pPr marL="342900" indent="-342900">
+              <a:buFont typeface="+mj-lt"/>
+              <a:buAutoNum type="arabicPeriod"/>
+            </a:pPr>
+            <a:r>
+              <a:rPr lang="en-IN" dirty="0"/>
+              <a:t>Environment</a:t>
+            </a:r>
           </a:p>
           <a:p>
-            <a:r>
-              <a:rPr lang="en-IN">
-                <a:hlinkClick r:id="rId3"/>
-              </a:rPr>
-              <a:t>https://cass-kul.github.io/</a:t>
-            </a:r>
-            <a:endParaRPr lang="en-IN"/>
+            <a:pPr lvl="1"/>
+            <a:r>
+              <a:rPr lang="en-IN" dirty="0"/>
+              <a:t>Add testbench infra / classes that run checks on code</a:t>
+            </a:r>
           </a:p>
           <a:p>
-            <a:endParaRPr lang="en-IN"/>
+            <a:pPr lvl="1"/>
+            <a:r>
+              <a:rPr lang="en-IN" dirty="0"/>
+              <a:t>Add testbench infra / classes that track execution performance</a:t>
+            </a:r>
+            <a:endParaRPr lang="en-US" dirty="0"/>
+          </a:p>
+          <a:p>
+            <a:pPr marL="342900" indent="-342900">
+              <a:buFont typeface="+mj-lt"/>
+              <a:buAutoNum type="arabicPeriod"/>
+            </a:pPr>
+            <a:r>
+              <a:rPr lang="en-US" dirty="0"/>
+              <a:t>Implementation</a:t>
+            </a:r>
+          </a:p>
+          <a:p>
+            <a:pPr lvl="1"/>
+            <a:r>
+              <a:rPr lang="en-US" dirty="0"/>
+              <a:t>Exceptions, Traps and Interrupts</a:t>
+            </a:r>
+          </a:p>
+          <a:p>
+            <a:pPr lvl="1"/>
+            <a:r>
+              <a:rPr lang="en-US" dirty="0"/>
+              <a:t>Pipelined Multi Cycle Core, hierarchical memory</a:t>
+            </a:r>
           </a:p>
         </p:txBody>
       </p:sp>
     </p:spTree>
     <p:extLst>
       <p:ext uri="{BB962C8B-B14F-4D97-AF65-F5344CB8AC3E}">
-        <p14:creationId xmlns:p14="http://schemas.microsoft.com/office/powerpoint/2010/main" val="1431337137"/>
+        <p14:creationId xmlns:p14="http://schemas.microsoft.com/office/powerpoint/2010/main" val="2988230929"/>
       </p:ext>
     </p:extLst>
   </p:cSld>

</xml_diff>